<commit_message>
Notizen zu PP hinzugefügt
</commit_message>
<xml_diff>
--- a/Präsentation/PräsiCarchain/Carchain Präsentation.pptx
+++ b/Präsentation/PräsiCarchain/Carchain Präsentation.pptx
@@ -64,12 +64,12 @@
       <p:boldItalic r:id="rId50"/>
     </p:embeddedFont>
     <p:embeddedFont>
-      <p:font typeface="Roboto Light" panose="020B0604020202020204" charset="0"/>
+      <p:font typeface="Roboto Light" panose="02000000000000000000" pitchFamily="2" charset="0"/>
       <p:regular r:id="rId51"/>
       <p:italic r:id="rId52"/>
     </p:embeddedFont>
     <p:embeddedFont>
-      <p:font typeface="Roboto Thin" panose="020B0604020202020204" charset="0"/>
+      <p:font typeface="Roboto Thin" panose="02000000000000000000" pitchFamily="2" charset="0"/>
       <p:regular r:id="rId53"/>
       <p:italic r:id="rId54"/>
     </p:embeddedFont>
@@ -855,7 +855,50 @@
               </a:spcAft>
               <a:buNone/>
             </a:pPr>
-            <a:endParaRPr/>
+            <a:r>
+              <a:rPr lang="de-DE" dirty="0"/>
+              <a:t>Hallo und Willkommen zur Vorstellung von „</a:t>
+            </a:r>
+            <a:r>
+              <a:rPr lang="de-DE" dirty="0" err="1"/>
+              <a:t>Carchain</a:t>
+            </a:r>
+            <a:r>
+              <a:rPr lang="de-DE" dirty="0"/>
+              <a:t>“ – dem </a:t>
+            </a:r>
+            <a:r>
+              <a:rPr lang="de-DE" dirty="0" err="1"/>
+              <a:t>vertrauenswürdgien</a:t>
+            </a:r>
+            <a:r>
+              <a:rPr lang="de-DE" dirty="0"/>
+              <a:t> Carsharing via Blockchain.</a:t>
+            </a:r>
+            <a:br>
+              <a:rPr lang="de-DE" dirty="0"/>
+            </a:br>
+            <a:r>
+              <a:rPr lang="de-DE" dirty="0"/>
+              <a:t>Mein Name ist Simon Gaugler und zusammen mit Nils Riekers, Lukas </a:t>
+            </a:r>
+            <a:r>
+              <a:rPr lang="de-DE" dirty="0" err="1"/>
+              <a:t>Faiß</a:t>
+            </a:r>
+            <a:r>
+              <a:rPr lang="de-DE" dirty="0"/>
+              <a:t> und Bastian </a:t>
+            </a:r>
+            <a:r>
+              <a:rPr lang="de-DE" dirty="0" err="1"/>
+              <a:t>Frewert</a:t>
+            </a:r>
+            <a:r>
+              <a:rPr lang="de-DE" dirty="0"/>
+              <a:t> möchte Ich Ihnen nun die Ergebnisse unseres Projektes präsentieren.</a:t>
+            </a:r>
+            <a:endParaRPr dirty="0"/>
           </a:p>
         </p:txBody>
       </p:sp>
@@ -949,6 +992,33 @@
             <a:noAutofit/>
           </a:bodyPr>
           <a:lstStyle/>
+          <a:p>
+            <a:pPr marL="0" lvl="0" indent="0" algn="l" rtl="0">
+              <a:spcBef>
+                <a:spcPts val="0"/>
+              </a:spcBef>
+              <a:spcAft>
+                <a:spcPts val="0"/>
+              </a:spcAft>
+              <a:buNone/>
+            </a:pPr>
+            <a:r>
+              <a:rPr lang="de-DE" dirty="0"/>
+              <a:t>Alice kauft in aller Ruhe ein, bringt ihre Einkäufe nach Hause -</a:t>
+            </a:r>
+          </a:p>
+          <a:p>
+            <a:pPr marL="0" lvl="0" indent="0" algn="l" rtl="0">
+              <a:spcBef>
+                <a:spcPts val="0"/>
+              </a:spcBef>
+              <a:spcAft>
+                <a:spcPts val="0"/>
+              </a:spcAft>
+              <a:buNone/>
+            </a:pPr>
+            <a:endParaRPr lang="de-DE" dirty="0"/>
+          </a:p>
           <a:p>
             <a:pPr marL="0" lvl="0" indent="0" algn="l" rtl="0">
               <a:spcBef>
@@ -1153,6 +1223,33 @@
             </a:pPr>
             <a:r>
               <a:rPr lang="de-DE" dirty="0"/>
+              <a:t>Und gibt das Auto einfach rechtzeitig wieder an seiner Heimatadresse zurück.</a:t>
+            </a:r>
+          </a:p>
+          <a:p>
+            <a:pPr marL="0" lvl="0" indent="0" algn="l" rtl="0">
+              <a:spcBef>
+                <a:spcPts val="0"/>
+              </a:spcBef>
+              <a:spcAft>
+                <a:spcPts val="0"/>
+              </a:spcAft>
+              <a:buNone/>
+            </a:pPr>
+            <a:endParaRPr lang="de-DE" dirty="0"/>
+          </a:p>
+          <a:p>
+            <a:pPr marL="0" lvl="0" indent="0" algn="l" rtl="0">
+              <a:spcBef>
+                <a:spcPts val="0"/>
+              </a:spcBef>
+              <a:spcAft>
+                <a:spcPts val="0"/>
+              </a:spcAft>
+              <a:buNone/>
+            </a:pPr>
+            <a:r>
+              <a:rPr lang="de-DE" dirty="0"/>
               <a:t>(Idee mit Piktogrammen &amp; Animationen)</a:t>
             </a:r>
             <a:br>
@@ -1345,6 +1442,60 @@
             </a:pPr>
             <a:r>
               <a:rPr lang="de-DE" dirty="0"/>
+              <a:t>Alice konnte einkaufen, Bob hat nebenher etwas Geld verdient, alle sind happy und es herrscht Friede, Freude und Eierkuchen!</a:t>
+            </a:r>
+          </a:p>
+          <a:p>
+            <a:pPr marL="0" lvl="0" indent="0" algn="l" rtl="0">
+              <a:spcBef>
+                <a:spcPts val="0"/>
+              </a:spcBef>
+              <a:spcAft>
+                <a:spcPts val="0"/>
+              </a:spcAft>
+              <a:buNone/>
+            </a:pPr>
+            <a:r>
+              <a:rPr lang="de-DE" dirty="0"/>
+              <a:t>Soweit unsere Idee. Schauen wir uns nun an, wie wir das umgesetzt haben.</a:t>
+            </a:r>
+          </a:p>
+          <a:p>
+            <a:pPr marL="0" lvl="0" indent="0" algn="l" rtl="0">
+              <a:spcBef>
+                <a:spcPts val="0"/>
+              </a:spcBef>
+              <a:spcAft>
+                <a:spcPts val="0"/>
+              </a:spcAft>
+              <a:buNone/>
+            </a:pPr>
+            <a:endParaRPr lang="de-DE" dirty="0"/>
+          </a:p>
+          <a:p>
+            <a:pPr marL="0" lvl="0" indent="0" algn="l" rtl="0">
+              <a:spcBef>
+                <a:spcPts val="0"/>
+              </a:spcBef>
+              <a:spcAft>
+                <a:spcPts val="0"/>
+              </a:spcAft>
+              <a:buNone/>
+            </a:pPr>
+            <a:endParaRPr lang="de-DE" dirty="0"/>
+          </a:p>
+          <a:p>
+            <a:pPr marL="0" lvl="0" indent="0" algn="l" rtl="0">
+              <a:spcBef>
+                <a:spcPts val="0"/>
+              </a:spcBef>
+              <a:spcAft>
+                <a:spcPts val="0"/>
+              </a:spcAft>
+              <a:buNone/>
+            </a:pPr>
+            <a:r>
+              <a:rPr lang="de-DE" dirty="0"/>
               <a:t>(Idee mit Piktogrammen &amp; Animationen)</a:t>
             </a:r>
             <a:br>
@@ -1535,7 +1686,87 @@
               </a:spcAft>
               <a:buNone/>
             </a:pPr>
-            <a:endParaRPr/>
+            <a:r>
+              <a:rPr lang="de-DE" dirty="0"/>
+              <a:t>Um das Konzept so zu realisieren, benötigten wir insbesondere 4 Komponenten. </a:t>
+            </a:r>
+          </a:p>
+          <a:p>
+            <a:pPr marL="0" lvl="0" indent="0" algn="l" rtl="0">
+              <a:spcBef>
+                <a:spcPts val="0"/>
+              </a:spcBef>
+              <a:spcAft>
+                <a:spcPts val="0"/>
+              </a:spcAft>
+              <a:buNone/>
+            </a:pPr>
+            <a:r>
+              <a:rPr lang="de-DE" dirty="0"/>
+              <a:t>Zum einen </a:t>
+            </a:r>
+            <a:r>
+              <a:rPr lang="de-DE" dirty="0" err="1"/>
+              <a:t>einen</a:t>
+            </a:r>
+            <a:r>
+              <a:rPr lang="de-DE" dirty="0"/>
+              <a:t> Raspberry Pi um unser Auto „smart“ zu machen,</a:t>
+            </a:r>
+          </a:p>
+          <a:p>
+            <a:pPr marL="0" lvl="0" indent="0" algn="l" rtl="0">
+              <a:spcBef>
+                <a:spcPts val="0"/>
+              </a:spcBef>
+              <a:spcAft>
+                <a:spcPts val="0"/>
+              </a:spcAft>
+              <a:buNone/>
+            </a:pPr>
+            <a:r>
+              <a:rPr lang="de-DE" dirty="0"/>
+              <a:t>Eine mobile App für das Handling der Transaktionen,</a:t>
+            </a:r>
+          </a:p>
+          <a:p>
+            <a:pPr marL="0" lvl="0" indent="0" algn="l" rtl="0">
+              <a:spcBef>
+                <a:spcPts val="0"/>
+              </a:spcBef>
+              <a:spcAft>
+                <a:spcPts val="0"/>
+              </a:spcAft>
+              <a:buNone/>
+            </a:pPr>
+            <a:r>
+              <a:rPr lang="de-DE" dirty="0"/>
+              <a:t>Natürlich die entsprechenden Smart </a:t>
+            </a:r>
+            <a:r>
+              <a:rPr lang="de-DE" dirty="0" err="1"/>
+              <a:t>Contracts</a:t>
+            </a:r>
+            <a:r>
+              <a:rPr lang="de-DE" dirty="0"/>
+              <a:t> auf der Blockchain und – </a:t>
+            </a:r>
+          </a:p>
+          <a:p>
+            <a:pPr marL="0" lvl="0" indent="0" algn="l" rtl="0">
+              <a:spcBef>
+                <a:spcPts val="0"/>
+              </a:spcBef>
+              <a:spcAft>
+                <a:spcPts val="0"/>
+              </a:spcAft>
+              <a:buNone/>
+            </a:pPr>
+            <a:r>
+              <a:rPr lang="de-DE" dirty="0"/>
+              <a:t>Wie sich herausgestellt hat, einen separaten Image Server.</a:t>
+            </a:r>
+            <a:endParaRPr dirty="0"/>
           </a:p>
         </p:txBody>
       </p:sp>
@@ -1639,7 +1870,79 @@
               </a:spcAft>
               <a:buNone/>
             </a:pPr>
-            <a:endParaRPr/>
+            <a:r>
+              <a:rPr lang="de-DE" dirty="0"/>
+              <a:t>Die resultierende Architektur sieht grob wie folgt aus:</a:t>
+            </a:r>
+          </a:p>
+          <a:p>
+            <a:pPr marL="0" lvl="0" indent="0" algn="l" rtl="0">
+              <a:spcBef>
+                <a:spcPts val="0"/>
+              </a:spcBef>
+              <a:spcAft>
+                <a:spcPts val="0"/>
+              </a:spcAft>
+              <a:buNone/>
+            </a:pPr>
+            <a:r>
+              <a:rPr lang="de-DE" dirty="0"/>
+              <a:t>Das Auto verbindet sich mit der Blockchain um seine Daten einzutragen und Mieter zu validieren und mit dem Image Server um seine Bilder hochzuladen bzw. ggf. aktuell zu halten.</a:t>
+            </a:r>
+          </a:p>
+          <a:p>
+            <a:pPr marL="0" lvl="0" indent="0" algn="l" rtl="0">
+              <a:spcBef>
+                <a:spcPts val="0"/>
+              </a:spcBef>
+              <a:spcAft>
+                <a:spcPts val="0"/>
+              </a:spcAft>
+              <a:buNone/>
+            </a:pPr>
+            <a:r>
+              <a:rPr lang="de-DE" dirty="0"/>
+              <a:t>Die Smartphone App verbindet sich ebenfalls mit der Blockchain um verfügbare Autos anzuzeigen und Mieten zu verwalten und mit dem Bilder Server um die Bilder der Autos anzuzeigen.</a:t>
+            </a:r>
+          </a:p>
+          <a:p>
+            <a:pPr marL="0" lvl="0" indent="0" algn="l" rtl="0">
+              <a:spcBef>
+                <a:spcPts val="0"/>
+              </a:spcBef>
+              <a:spcAft>
+                <a:spcPts val="0"/>
+              </a:spcAft>
+              <a:buNone/>
+            </a:pPr>
+            <a:r>
+              <a:rPr lang="de-DE" dirty="0"/>
+              <a:t>Um Zugriff auf das Fahrzeug zu erhalten, scannt da </a:t>
+            </a:r>
+            <a:r>
+              <a:rPr lang="de-DE" dirty="0" err="1"/>
+              <a:t>sAuto</a:t>
+            </a:r>
+            <a:r>
+              <a:rPr lang="de-DE" dirty="0"/>
+              <a:t> den Barcode der App und validiert die Informationen.</a:t>
+            </a:r>
+          </a:p>
+          <a:p>
+            <a:pPr marL="0" lvl="0" indent="0" algn="l" rtl="0">
+              <a:spcBef>
+                <a:spcPts val="0"/>
+              </a:spcBef>
+              <a:spcAft>
+                <a:spcPts val="0"/>
+              </a:spcAft>
+              <a:buNone/>
+            </a:pPr>
+            <a:r>
+              <a:rPr lang="de-DE" dirty="0"/>
+              <a:t>Schauen wir uns jetzt die Einzelnen Komponenten im Detail an – zunächst geht Lukas auf den Image-Server ein…</a:t>
+            </a:r>
+            <a:endParaRPr dirty="0"/>
           </a:p>
         </p:txBody>
       </p:sp>
@@ -1743,7 +2046,7 @@
               </a:spcAft>
               <a:buNone/>
             </a:pPr>
-            <a:endParaRPr/>
+            <a:endParaRPr dirty="0"/>
           </a:p>
         </p:txBody>
       </p:sp>
@@ -1956,7 +2259,79 @@
               </a:spcAft>
               <a:buNone/>
             </a:pPr>
-            <a:endParaRPr/>
+            <a:r>
+              <a:rPr lang="de-DE" dirty="0"/>
+              <a:t>Danke Lukas. Nun zur App.</a:t>
+            </a:r>
+          </a:p>
+          <a:p>
+            <a:pPr marL="0" lvl="0" indent="0" algn="l" rtl="0">
+              <a:spcBef>
+                <a:spcPts val="0"/>
+              </a:spcBef>
+              <a:spcAft>
+                <a:spcPts val="0"/>
+              </a:spcAft>
+              <a:buNone/>
+            </a:pPr>
+            <a:r>
+              <a:rPr lang="de-DE" dirty="0"/>
+              <a:t>Die App hat insbesondere </a:t>
+            </a:r>
+            <a:r>
+              <a:rPr lang="de-DE" dirty="0" err="1"/>
+              <a:t>fie</a:t>
+            </a:r>
+            <a:r>
+              <a:rPr lang="de-DE" dirty="0"/>
+              <a:t> Funktionen:</a:t>
+            </a:r>
+          </a:p>
+          <a:p>
+            <a:pPr marL="0" lvl="0" indent="0" algn="l" rtl="0">
+              <a:spcBef>
+                <a:spcPts val="0"/>
+              </a:spcBef>
+              <a:spcAft>
+                <a:spcPts val="0"/>
+              </a:spcAft>
+              <a:buNone/>
+            </a:pPr>
+            <a:r>
+              <a:rPr lang="de-DE" dirty="0"/>
+              <a:t>Fahrzeuge zur Vermietung freizugeben, Fahrzeuge suchen und mieten zu können,</a:t>
+            </a:r>
+          </a:p>
+          <a:p>
+            <a:pPr marL="0" lvl="0" indent="0" algn="l" rtl="0">
+              <a:spcBef>
+                <a:spcPts val="0"/>
+              </a:spcBef>
+              <a:spcAft>
+                <a:spcPts val="0"/>
+              </a:spcAft>
+              <a:buNone/>
+            </a:pPr>
+            <a:r>
+              <a:rPr lang="de-DE" dirty="0"/>
+              <a:t>Die entstandenen Kosten und Rechnungen einzusehen – also quasi das Bezahlwallet zu verwalten –</a:t>
+            </a:r>
+          </a:p>
+          <a:p>
+            <a:pPr marL="0" lvl="0" indent="0" algn="l" rtl="0">
+              <a:spcBef>
+                <a:spcPts val="0"/>
+              </a:spcBef>
+              <a:spcAft>
+                <a:spcPts val="0"/>
+              </a:spcAft>
+              <a:buNone/>
+            </a:pPr>
+            <a:r>
+              <a:rPr lang="de-DE" dirty="0"/>
+              <a:t>Den digitalen Autoschlüssel bereitzustellen und natürlich das eigene Profil verwalten zu können.</a:t>
+            </a:r>
+            <a:endParaRPr dirty="0"/>
           </a:p>
         </p:txBody>
       </p:sp>
@@ -1969,11 +2344,11 @@
 </file>
 
 <file path=ppt/notesSlides/notesSlide18.xml><?xml version="1.0" encoding="utf-8"?>
-<p:notes xmlns:a="http://schemas.openxmlformats.org/drawingml/2006/main" xmlns:r="http://schemas.openxmlformats.org/officeDocument/2006/relationships" xmlns:p="http://schemas.openxmlformats.org/presentationml/2006/main" showMasterSp="0" showMasterPhAnim="0">
+<p:notes xmlns:a="http://schemas.openxmlformats.org/drawingml/2006/main" xmlns:r="http://schemas.openxmlformats.org/officeDocument/2006/relationships" xmlns:p="http://schemas.openxmlformats.org/presentationml/2006/main">
   <p:cSld>
     <p:spTree>
       <p:nvGrpSpPr>
-        <p:cNvPr id="1" name="Shape 104"/>
+        <p:cNvPr id="1" name=""/>
         <p:cNvGrpSpPr/>
         <p:nvPr/>
       </p:nvGrpSpPr>
@@ -1987,12 +2362,12 @@
       </p:grpSpPr>
       <p:sp>
         <p:nvSpPr>
-          <p:cNvPr id="105" name="Google Shape;105;g7459a94ec7_0_45:notes"/>
+          <p:cNvPr id="2" name="Folienbildplatzhalter 1"/>
           <p:cNvSpPr>
             <a:spLocks noGrp="1" noRot="1" noChangeAspect="1"/>
           </p:cNvSpPr>
           <p:nvPr>
-            <p:ph type="sldImg" idx="2"/>
+            <p:ph type="sldImg"/>
           </p:nvPr>
         </p:nvSpPr>
         <p:spPr>
@@ -2000,146 +2375,39 @@
             <a:off x="381000" y="685800"/>
             <a:ext cx="6096000" cy="3429000"/>
           </a:xfrm>
-          <a:custGeom>
-            <a:avLst/>
-            <a:gdLst/>
-            <a:ahLst/>
-            <a:cxnLst/>
-            <a:rect l="l" t="t" r="r" b="b"/>
-            <a:pathLst>
-              <a:path w="120000" h="120000" extrusionOk="0">
-                <a:moveTo>
-                  <a:pt x="0" y="0"/>
-                </a:moveTo>
-                <a:lnTo>
-                  <a:pt x="120000" y="0"/>
-                </a:lnTo>
-                <a:lnTo>
-                  <a:pt x="120000" y="120000"/>
-                </a:lnTo>
-                <a:lnTo>
-                  <a:pt x="0" y="120000"/>
-                </a:lnTo>
-                <a:close/>
-              </a:path>
-            </a:pathLst>
-          </a:custGeom>
         </p:spPr>
       </p:sp>
       <p:sp>
         <p:nvSpPr>
-          <p:cNvPr id="106" name="Google Shape;106;g7459a94ec7_0_45:notes"/>
-          <p:cNvSpPr txBox="1">
+          <p:cNvPr id="3" name="Notizenplatzhalter 2"/>
+          <p:cNvSpPr>
             <a:spLocks noGrp="1"/>
           </p:cNvSpPr>
           <p:nvPr>
             <p:ph type="body" idx="1"/>
           </p:nvPr>
         </p:nvSpPr>
-        <p:spPr>
-          <a:xfrm>
-            <a:off x="685800" y="4343400"/>
-            <a:ext cx="5486400" cy="4114800"/>
-          </a:xfrm>
-          <a:prstGeom prst="rect">
-            <a:avLst/>
-          </a:prstGeom>
-        </p:spPr>
+        <p:spPr/>
         <p:txBody>
-          <a:bodyPr spcFirstLastPara="1" wrap="square" lIns="91425" tIns="91425" rIns="91425" bIns="91425" anchor="t" anchorCtr="0">
-            <a:noAutofit/>
-          </a:bodyPr>
+          <a:bodyPr/>
           <a:lstStyle/>
           <a:p>
-            <a:pPr marL="0" lvl="0" indent="0" algn="l" rtl="0">
-              <a:spcBef>
-                <a:spcPts val="0"/>
-              </a:spcBef>
-              <a:spcAft>
-                <a:spcPts val="0"/>
-              </a:spcAft>
+            <a:pPr marL="158750" indent="0">
               <a:buNone/>
             </a:pPr>
             <a:r>
-              <a:rPr lang="de" u="sng">
-                <a:solidFill>
-                  <a:schemeClr val="hlink"/>
-                </a:solidFill>
-                <a:hlinkClick r:id="rId3"/>
-              </a:rPr>
-              <a:t>https://ethereum.org/assets/#black-on-transparent-background</a:t>
-            </a:r>
-            <a:endParaRPr/>
-          </a:p>
-          <a:p>
-            <a:pPr marL="0" lvl="0" indent="0" algn="l" rtl="0">
-              <a:spcBef>
-                <a:spcPts val="0"/>
-              </a:spcBef>
-              <a:spcAft>
-                <a:spcPts val="0"/>
-              </a:spcAft>
-              <a:buNone/>
-            </a:pPr>
-            <a:r>
-              <a:rPr lang="de" u="sng">
-                <a:solidFill>
-                  <a:schemeClr val="hlink"/>
-                </a:solidFill>
-                <a:hlinkClick r:id="rId4"/>
-              </a:rPr>
-              <a:t>https://daiki-sekiguchi.com/2018/08/08/ethereum-what-is-ganache/</a:t>
-            </a:r>
-            <a:endParaRPr/>
-          </a:p>
-          <a:p>
-            <a:pPr marL="0" lvl="0" indent="0" algn="l" rtl="0">
-              <a:spcBef>
-                <a:spcPts val="0"/>
-              </a:spcBef>
-              <a:spcAft>
-                <a:spcPts val="0"/>
-              </a:spcAft>
-              <a:buNone/>
-            </a:pPr>
-            <a:r>
-              <a:rPr lang="de" u="sng">
-                <a:solidFill>
-                  <a:schemeClr val="hlink"/>
-                </a:solidFill>
-                <a:hlinkClick r:id="rId5"/>
-              </a:rPr>
-              <a:t>https://solidity.readthedocs.io/en/v0.6.6/</a:t>
-            </a:r>
-            <a:endParaRPr/>
-          </a:p>
-          <a:p>
-            <a:pPr marL="0" lvl="0" indent="0" algn="l" rtl="0">
-              <a:spcBef>
-                <a:spcPts val="0"/>
-              </a:spcBef>
-              <a:spcAft>
-                <a:spcPts val="0"/>
-              </a:spcAft>
-              <a:buNone/>
-            </a:pPr>
-            <a:endParaRPr/>
-          </a:p>
-          <a:p>
-            <a:pPr marL="0" lvl="0" indent="0" algn="l" rtl="0">
-              <a:spcBef>
-                <a:spcPts val="0"/>
-              </a:spcBef>
-              <a:spcAft>
-                <a:spcPts val="0"/>
-              </a:spcAft>
-              <a:buNone/>
-            </a:pPr>
-            <a:endParaRPr/>
+              <a:rPr lang="de-DE" dirty="0"/>
+              <a:t>Die Fahrzeuge werden in der App in einer übersichtlichen Liste dargestellt. Angezeigt werden die aktuelle Entfernung und der Stundenpreis, sowie Modell, Bild und die minimale und maximale Mietdauer in Stunden. Die Liste ist standardmäßig nach Entfernung sortiert, es kann aber auch nach Preis und Ausleihdauer gefiltert werden.</a:t>
+            </a:r>
           </a:p>
         </p:txBody>
       </p:sp>
     </p:spTree>
+    <p:extLst>
+      <p:ext uri="{BB962C8B-B14F-4D97-AF65-F5344CB8AC3E}">
+        <p14:creationId xmlns:p14="http://schemas.microsoft.com/office/powerpoint/2010/main" val="2711036244"/>
+      </p:ext>
+    </p:extLst>
   </p:cSld>
   <p:clrMapOvr>
     <a:masterClrMapping/>
@@ -2148,11 +2416,11 @@
 </file>
 
 <file path=ppt/notesSlides/notesSlide19.xml><?xml version="1.0" encoding="utf-8"?>
-<p:notes xmlns:a="http://schemas.openxmlformats.org/drawingml/2006/main" xmlns:r="http://schemas.openxmlformats.org/officeDocument/2006/relationships" xmlns:p="http://schemas.openxmlformats.org/presentationml/2006/main" showMasterSp="0" showMasterPhAnim="0">
+<p:notes xmlns:a="http://schemas.openxmlformats.org/drawingml/2006/main" xmlns:r="http://schemas.openxmlformats.org/officeDocument/2006/relationships" xmlns:p="http://schemas.openxmlformats.org/presentationml/2006/main">
   <p:cSld>
     <p:spTree>
       <p:nvGrpSpPr>
-        <p:cNvPr id="1" name="Shape 113"/>
+        <p:cNvPr id="1" name=""/>
         <p:cNvGrpSpPr/>
         <p:nvPr/>
       </p:nvGrpSpPr>
@@ -2166,12 +2434,12 @@
       </p:grpSpPr>
       <p:sp>
         <p:nvSpPr>
-          <p:cNvPr id="114" name="Google Shape;114;g7459a94ec7_1_4:notes"/>
+          <p:cNvPr id="2" name="Folienbildplatzhalter 1"/>
           <p:cNvSpPr>
             <a:spLocks noGrp="1" noRot="1" noChangeAspect="1"/>
           </p:cNvSpPr>
           <p:nvPr>
-            <p:ph type="sldImg" idx="2"/>
+            <p:ph type="sldImg"/>
           </p:nvPr>
         </p:nvSpPr>
         <p:spPr>
@@ -2179,71 +2447,42 @@
             <a:off x="381000" y="685800"/>
             <a:ext cx="6096000" cy="3429000"/>
           </a:xfrm>
-          <a:custGeom>
-            <a:avLst/>
-            <a:gdLst/>
-            <a:ahLst/>
-            <a:cxnLst/>
-            <a:rect l="l" t="t" r="r" b="b"/>
-            <a:pathLst>
-              <a:path w="120000" h="120000" extrusionOk="0">
-                <a:moveTo>
-                  <a:pt x="0" y="0"/>
-                </a:moveTo>
-                <a:lnTo>
-                  <a:pt x="120000" y="0"/>
-                </a:lnTo>
-                <a:lnTo>
-                  <a:pt x="120000" y="120000"/>
-                </a:lnTo>
-                <a:lnTo>
-                  <a:pt x="0" y="120000"/>
-                </a:lnTo>
-                <a:close/>
-              </a:path>
-            </a:pathLst>
-          </a:custGeom>
         </p:spPr>
       </p:sp>
       <p:sp>
         <p:nvSpPr>
-          <p:cNvPr id="115" name="Google Shape;115;g7459a94ec7_1_4:notes"/>
-          <p:cNvSpPr txBox="1">
+          <p:cNvPr id="3" name="Notizenplatzhalter 2"/>
+          <p:cNvSpPr>
             <a:spLocks noGrp="1"/>
           </p:cNvSpPr>
           <p:nvPr>
             <p:ph type="body" idx="1"/>
           </p:nvPr>
         </p:nvSpPr>
-        <p:spPr>
-          <a:xfrm>
-            <a:off x="685800" y="4343400"/>
-            <a:ext cx="5486400" cy="4114800"/>
-          </a:xfrm>
-          <a:prstGeom prst="rect">
-            <a:avLst/>
-          </a:prstGeom>
-        </p:spPr>
+        <p:spPr/>
         <p:txBody>
-          <a:bodyPr spcFirstLastPara="1" wrap="square" lIns="91425" tIns="91425" rIns="91425" bIns="91425" anchor="t" anchorCtr="0">
-            <a:noAutofit/>
-          </a:bodyPr>
+          <a:bodyPr/>
           <a:lstStyle/>
           <a:p>
-            <a:pPr marL="0" lvl="0" indent="0" algn="l" rtl="0">
-              <a:spcBef>
-                <a:spcPts val="0"/>
-              </a:spcBef>
-              <a:spcAft>
-                <a:spcPts val="0"/>
-              </a:spcAft>
-              <a:buNone/>
-            </a:pPr>
-            <a:endParaRPr/>
+            <a:r>
+              <a:rPr lang="de-DE" dirty="0"/>
+              <a:t>Wenn uns ein Auto gefällt, können wir die konkreten Daten einsehen. Dazu zählen weitere Informationen zum Modell, das Nummernschild und die Heimatadresse sowie die Kosten abhängig von der gewünschten Mietlänge.</a:t>
+            </a:r>
+          </a:p>
+          <a:p>
+            <a:r>
+              <a:rPr lang="de-DE" dirty="0"/>
+              <a:t>Gefällt uns das Auto, können wir es mit einem Klick auf den Button einfach Mieten.</a:t>
+            </a:r>
           </a:p>
         </p:txBody>
       </p:sp>
     </p:spTree>
+    <p:extLst>
+      <p:ext uri="{BB962C8B-B14F-4D97-AF65-F5344CB8AC3E}">
+        <p14:creationId xmlns:p14="http://schemas.microsoft.com/office/powerpoint/2010/main" val="164548562"/>
+      </p:ext>
+    </p:extLst>
   </p:cSld>
   <p:clrMapOvr>
     <a:masterClrMapping/>
@@ -2343,7 +2582,48 @@
               </a:spcAft>
               <a:buNone/>
             </a:pPr>
-            <a:endParaRPr/>
+            <a:r>
+              <a:rPr lang="de-DE" dirty="0"/>
+              <a:t>Zunächst geben wir einen kurzen Überblick über die Aufgabe, unsere Ideen und die Vision des Projektes.</a:t>
+            </a:r>
+          </a:p>
+          <a:p>
+            <a:pPr marL="0" lvl="0" indent="0" algn="l" rtl="0">
+              <a:spcBef>
+                <a:spcPts val="0"/>
+              </a:spcBef>
+              <a:spcAft>
+                <a:spcPts val="0"/>
+              </a:spcAft>
+              <a:buNone/>
+            </a:pPr>
+            <a:r>
+              <a:rPr lang="de-DE" dirty="0"/>
+              <a:t>Anschließend werden wir unsere Architektur und die einzelnen Komponenten detaillierter erläutern und ihnen dann mit einer Demo </a:t>
+            </a:r>
+            <a:r>
+              <a:rPr lang="de-DE" dirty="0" err="1"/>
+              <a:t>carchain</a:t>
+            </a:r>
+            <a:r>
+              <a:rPr lang="de-DE" dirty="0"/>
+              <a:t> natürlich auch präsentieren.</a:t>
+            </a:r>
+          </a:p>
+          <a:p>
+            <a:pPr marL="0" lvl="0" indent="0" algn="l" rtl="0">
+              <a:spcBef>
+                <a:spcPts val="0"/>
+              </a:spcBef>
+              <a:spcAft>
+                <a:spcPts val="0"/>
+              </a:spcAft>
+              <a:buNone/>
+            </a:pPr>
+            <a:r>
+              <a:rPr lang="de-DE" dirty="0"/>
+              <a:t>In unserem kurzen Fazit fassen wir zusammen, was wir aus dem Projekt mitgenommen haben.</a:t>
+            </a:r>
           </a:p>
         </p:txBody>
       </p:sp>
@@ -2356,6 +2636,578 @@
 </file>
 
 <file path=ppt/notesSlides/notesSlide20.xml><?xml version="1.0" encoding="utf-8"?>
+<p:notes xmlns:a="http://schemas.openxmlformats.org/drawingml/2006/main" xmlns:r="http://schemas.openxmlformats.org/officeDocument/2006/relationships" xmlns:p="http://schemas.openxmlformats.org/presentationml/2006/main">
+  <p:cSld>
+    <p:spTree>
+      <p:nvGrpSpPr>
+        <p:cNvPr id="1" name=""/>
+        <p:cNvGrpSpPr/>
+        <p:nvPr/>
+      </p:nvGrpSpPr>
+      <p:grpSpPr>
+        <a:xfrm>
+          <a:off x="0" y="0"/>
+          <a:ext cx="0" cy="0"/>
+          <a:chOff x="0" y="0"/>
+          <a:chExt cx="0" cy="0"/>
+        </a:xfrm>
+      </p:grpSpPr>
+      <p:sp>
+        <p:nvSpPr>
+          <p:cNvPr id="2" name="Folienbildplatzhalter 1"/>
+          <p:cNvSpPr>
+            <a:spLocks noGrp="1" noRot="1" noChangeAspect="1"/>
+          </p:cNvSpPr>
+          <p:nvPr>
+            <p:ph type="sldImg"/>
+          </p:nvPr>
+        </p:nvSpPr>
+        <p:spPr>
+          <a:xfrm>
+            <a:off x="381000" y="685800"/>
+            <a:ext cx="6096000" cy="3429000"/>
+          </a:xfrm>
+        </p:spPr>
+      </p:sp>
+      <p:sp>
+        <p:nvSpPr>
+          <p:cNvPr id="3" name="Notizenplatzhalter 2"/>
+          <p:cNvSpPr>
+            <a:spLocks noGrp="1"/>
+          </p:cNvSpPr>
+          <p:nvPr>
+            <p:ph type="body" idx="1"/>
+          </p:nvPr>
+        </p:nvSpPr>
+        <p:spPr/>
+        <p:txBody>
+          <a:bodyPr/>
+          <a:lstStyle/>
+          <a:p>
+            <a:r>
+              <a:rPr lang="de-DE" dirty="0"/>
+              <a:t>Das Auto wird dann </a:t>
+            </a:r>
+            <a:r>
+              <a:rPr lang="de-DE" dirty="0" err="1"/>
+              <a:t>gemeietet</a:t>
+            </a:r>
+            <a:r>
+              <a:rPr lang="de-DE" dirty="0"/>
+              <a:t> und in unserem Fuhrpark mit seinem digitalen Schlüssel angezeigt.</a:t>
+            </a:r>
+          </a:p>
+          <a:p>
+            <a:r>
+              <a:rPr lang="de-DE" dirty="0"/>
+              <a:t>Wir sehen, wie weit das Fahrzeug entfernt ist und wie lange die Miete noch läuft.</a:t>
+            </a:r>
+          </a:p>
+          <a:p>
+            <a:r>
+              <a:rPr lang="de-DE" dirty="0"/>
+              <a:t>Mit einem Klick auf das Fahrzeug wird der digitale Autoschlüssel erzeugt.</a:t>
+            </a:r>
+          </a:p>
+        </p:txBody>
+      </p:sp>
+    </p:spTree>
+    <p:extLst>
+      <p:ext uri="{BB962C8B-B14F-4D97-AF65-F5344CB8AC3E}">
+        <p14:creationId xmlns:p14="http://schemas.microsoft.com/office/powerpoint/2010/main" val="2683297920"/>
+      </p:ext>
+    </p:extLst>
+  </p:cSld>
+  <p:clrMapOvr>
+    <a:masterClrMapping/>
+  </p:clrMapOvr>
+</p:notes>
+</file>
+
+<file path=ppt/notesSlides/notesSlide21.xml><?xml version="1.0" encoding="utf-8"?>
+<p:notes xmlns:a="http://schemas.openxmlformats.org/drawingml/2006/main" xmlns:r="http://schemas.openxmlformats.org/officeDocument/2006/relationships" xmlns:p="http://schemas.openxmlformats.org/presentationml/2006/main">
+  <p:cSld>
+    <p:spTree>
+      <p:nvGrpSpPr>
+        <p:cNvPr id="1" name=""/>
+        <p:cNvGrpSpPr/>
+        <p:nvPr/>
+      </p:nvGrpSpPr>
+      <p:grpSpPr>
+        <a:xfrm>
+          <a:off x="0" y="0"/>
+          <a:ext cx="0" cy="0"/>
+          <a:chOff x="0" y="0"/>
+          <a:chExt cx="0" cy="0"/>
+        </a:xfrm>
+      </p:grpSpPr>
+      <p:sp>
+        <p:nvSpPr>
+          <p:cNvPr id="2" name="Folienbildplatzhalter 1"/>
+          <p:cNvSpPr>
+            <a:spLocks noGrp="1" noRot="1" noChangeAspect="1"/>
+          </p:cNvSpPr>
+          <p:nvPr>
+            <p:ph type="sldImg"/>
+          </p:nvPr>
+        </p:nvSpPr>
+        <p:spPr>
+          <a:xfrm>
+            <a:off x="381000" y="685800"/>
+            <a:ext cx="6096000" cy="3429000"/>
+          </a:xfrm>
+        </p:spPr>
+      </p:sp>
+      <p:sp>
+        <p:nvSpPr>
+          <p:cNvPr id="3" name="Notizenplatzhalter 2"/>
+          <p:cNvSpPr>
+            <a:spLocks noGrp="1"/>
+          </p:cNvSpPr>
+          <p:nvPr>
+            <p:ph type="body" idx="1"/>
+          </p:nvPr>
+        </p:nvSpPr>
+        <p:spPr/>
+        <p:txBody>
+          <a:bodyPr/>
+          <a:lstStyle/>
+          <a:p>
+            <a:r>
+              <a:rPr lang="de-DE" dirty="0"/>
+              <a:t>Dieser bündelt einige Informationen, anhand derer das Fahrzeug überprüfen kann, ob der User tatsächlich zur Nutzung des Fahrzeugs berechtigt ist.</a:t>
+            </a:r>
+          </a:p>
+          <a:p>
+            <a:r>
+              <a:rPr lang="de-DE" dirty="0"/>
+              <a:t>Sobald das Ende der Miete erreicht ist, ist der Schlüssel wieder wirkungslos und das Auto lässt sich nicht mehr öffnen.</a:t>
+            </a:r>
+          </a:p>
+        </p:txBody>
+      </p:sp>
+    </p:spTree>
+    <p:extLst>
+      <p:ext uri="{BB962C8B-B14F-4D97-AF65-F5344CB8AC3E}">
+        <p14:creationId xmlns:p14="http://schemas.microsoft.com/office/powerpoint/2010/main" val="255064321"/>
+      </p:ext>
+    </p:extLst>
+  </p:cSld>
+  <p:clrMapOvr>
+    <a:masterClrMapping/>
+  </p:clrMapOvr>
+</p:notes>
+</file>
+
+<file path=ppt/notesSlides/notesSlide22.xml><?xml version="1.0" encoding="utf-8"?>
+<p:notes xmlns:a="http://schemas.openxmlformats.org/drawingml/2006/main" xmlns:r="http://schemas.openxmlformats.org/officeDocument/2006/relationships" xmlns:p="http://schemas.openxmlformats.org/presentationml/2006/main">
+  <p:cSld>
+    <p:spTree>
+      <p:nvGrpSpPr>
+        <p:cNvPr id="1" name=""/>
+        <p:cNvGrpSpPr/>
+        <p:nvPr/>
+      </p:nvGrpSpPr>
+      <p:grpSpPr>
+        <a:xfrm>
+          <a:off x="0" y="0"/>
+          <a:ext cx="0" cy="0"/>
+          <a:chOff x="0" y="0"/>
+          <a:chExt cx="0" cy="0"/>
+        </a:xfrm>
+      </p:grpSpPr>
+      <p:sp>
+        <p:nvSpPr>
+          <p:cNvPr id="2" name="Folienbildplatzhalter 1"/>
+          <p:cNvSpPr>
+            <a:spLocks noGrp="1" noRot="1" noChangeAspect="1"/>
+          </p:cNvSpPr>
+          <p:nvPr>
+            <p:ph type="sldImg"/>
+          </p:nvPr>
+        </p:nvSpPr>
+        <p:spPr>
+          <a:xfrm>
+            <a:off x="381000" y="685800"/>
+            <a:ext cx="6096000" cy="3429000"/>
+          </a:xfrm>
+        </p:spPr>
+      </p:sp>
+      <p:sp>
+        <p:nvSpPr>
+          <p:cNvPr id="3" name="Notizenplatzhalter 2"/>
+          <p:cNvSpPr>
+            <a:spLocks noGrp="1"/>
+          </p:cNvSpPr>
+          <p:nvPr>
+            <p:ph type="body" idx="1"/>
+          </p:nvPr>
+        </p:nvSpPr>
+        <p:spPr/>
+        <p:txBody>
+          <a:bodyPr/>
+          <a:lstStyle/>
+          <a:p>
+            <a:r>
+              <a:rPr lang="de-DE" dirty="0"/>
+              <a:t>Leider traten bei der Realisierung einige Probleme auf. Die Ethereum-Connector-Bibliothek der Wahl web3j ist in der Android-Version leider noch etwas unausgereift.</a:t>
+            </a:r>
+          </a:p>
+          <a:p>
+            <a:r>
+              <a:rPr lang="de-DE" dirty="0"/>
+              <a:t>So können wir zwar eine Verbindung zu unserer Blockchain herstellen, jedoch schlagen alle Aufrufe der Methoden fehl – es wird stets ein ungültiger oder leerer Rückgabewert geliefert. Wir vermuten, der Fehler liegt unter Anderem in der Portierung der </a:t>
+            </a:r>
+            <a:r>
+              <a:rPr lang="de-DE" dirty="0" err="1"/>
+              <a:t>SmartContracts</a:t>
+            </a:r>
+            <a:r>
+              <a:rPr lang="de-DE" dirty="0"/>
+              <a:t> in Java-Methoden sowie auch an der Bibliothek selbst im Zusammenspiel mit </a:t>
+            </a:r>
+            <a:r>
+              <a:rPr lang="de-DE" dirty="0" err="1"/>
+              <a:t>self-hosted</a:t>
+            </a:r>
+            <a:r>
+              <a:rPr lang="de-DE" dirty="0"/>
+              <a:t> Ethereum Instanzen.</a:t>
+            </a:r>
+          </a:p>
+          <a:p>
+            <a:r>
+              <a:rPr lang="de-DE" dirty="0"/>
+              <a:t>Damit ist leider keine Anbindung der App an die Blockchain möglich gewesen</a:t>
+            </a:r>
+          </a:p>
+          <a:p>
+            <a:r>
+              <a:rPr lang="de-DE" dirty="0"/>
+              <a:t>Alternative Lösungswege wären eine alternative Library – sofern vorhanden, auf einen Bugfix zu warten oder auf ein zentrales Routing über unseren Server auszuweichen, was dem Grundgedanken aber widerspricht. Deshalb und mangels Zeit haben wir bis dato auf diese Alternativen verzichtet und beobachten rege die web3j </a:t>
+            </a:r>
+            <a:r>
+              <a:rPr lang="de-DE" dirty="0" err="1"/>
+              <a:t>github</a:t>
+            </a:r>
+            <a:r>
+              <a:rPr lang="de-DE" dirty="0"/>
+              <a:t> </a:t>
+            </a:r>
+            <a:r>
+              <a:rPr lang="de-DE" dirty="0" err="1"/>
+              <a:t>issues</a:t>
+            </a:r>
+            <a:r>
+              <a:rPr lang="de-DE" dirty="0"/>
+              <a:t>.</a:t>
+            </a:r>
+          </a:p>
+          <a:p>
+            <a:r>
+              <a:rPr lang="de-DE" dirty="0"/>
+              <a:t>Nun aber zum vermutlich spannendsten Teil – wie wir unsere Blockchain umgesetzt haben, erzählt euch nun Basti.</a:t>
+            </a:r>
+          </a:p>
+        </p:txBody>
+      </p:sp>
+    </p:spTree>
+    <p:extLst>
+      <p:ext uri="{BB962C8B-B14F-4D97-AF65-F5344CB8AC3E}">
+        <p14:creationId xmlns:p14="http://schemas.microsoft.com/office/powerpoint/2010/main" val="722521630"/>
+      </p:ext>
+    </p:extLst>
+  </p:cSld>
+  <p:clrMapOvr>
+    <a:masterClrMapping/>
+  </p:clrMapOvr>
+</p:notes>
+</file>
+
+<file path=ppt/notesSlides/notesSlide23.xml><?xml version="1.0" encoding="utf-8"?>
+<p:notes xmlns:a="http://schemas.openxmlformats.org/drawingml/2006/main" xmlns:r="http://schemas.openxmlformats.org/officeDocument/2006/relationships" xmlns:p="http://schemas.openxmlformats.org/presentationml/2006/main" showMasterSp="0" showMasterPhAnim="0">
+  <p:cSld>
+    <p:spTree>
+      <p:nvGrpSpPr>
+        <p:cNvPr id="1" name="Shape 104"/>
+        <p:cNvGrpSpPr/>
+        <p:nvPr/>
+      </p:nvGrpSpPr>
+      <p:grpSpPr>
+        <a:xfrm>
+          <a:off x="0" y="0"/>
+          <a:ext cx="0" cy="0"/>
+          <a:chOff x="0" y="0"/>
+          <a:chExt cx="0" cy="0"/>
+        </a:xfrm>
+      </p:grpSpPr>
+      <p:sp>
+        <p:nvSpPr>
+          <p:cNvPr id="105" name="Google Shape;105;g7459a94ec7_0_45:notes"/>
+          <p:cNvSpPr>
+            <a:spLocks noGrp="1" noRot="1" noChangeAspect="1"/>
+          </p:cNvSpPr>
+          <p:nvPr>
+            <p:ph type="sldImg" idx="2"/>
+          </p:nvPr>
+        </p:nvSpPr>
+        <p:spPr>
+          <a:xfrm>
+            <a:off x="381000" y="685800"/>
+            <a:ext cx="6096000" cy="3429000"/>
+          </a:xfrm>
+          <a:custGeom>
+            <a:avLst/>
+            <a:gdLst/>
+            <a:ahLst/>
+            <a:cxnLst/>
+            <a:rect l="l" t="t" r="r" b="b"/>
+            <a:pathLst>
+              <a:path w="120000" h="120000" extrusionOk="0">
+                <a:moveTo>
+                  <a:pt x="0" y="0"/>
+                </a:moveTo>
+                <a:lnTo>
+                  <a:pt x="120000" y="0"/>
+                </a:lnTo>
+                <a:lnTo>
+                  <a:pt x="120000" y="120000"/>
+                </a:lnTo>
+                <a:lnTo>
+                  <a:pt x="0" y="120000"/>
+                </a:lnTo>
+                <a:close/>
+              </a:path>
+            </a:pathLst>
+          </a:custGeom>
+        </p:spPr>
+      </p:sp>
+      <p:sp>
+        <p:nvSpPr>
+          <p:cNvPr id="106" name="Google Shape;106;g7459a94ec7_0_45:notes"/>
+          <p:cNvSpPr txBox="1">
+            <a:spLocks noGrp="1"/>
+          </p:cNvSpPr>
+          <p:nvPr>
+            <p:ph type="body" idx="1"/>
+          </p:nvPr>
+        </p:nvSpPr>
+        <p:spPr>
+          <a:xfrm>
+            <a:off x="685800" y="4343400"/>
+            <a:ext cx="5486400" cy="4114800"/>
+          </a:xfrm>
+          <a:prstGeom prst="rect">
+            <a:avLst/>
+          </a:prstGeom>
+        </p:spPr>
+        <p:txBody>
+          <a:bodyPr spcFirstLastPara="1" wrap="square" lIns="91425" tIns="91425" rIns="91425" bIns="91425" anchor="t" anchorCtr="0">
+            <a:noAutofit/>
+          </a:bodyPr>
+          <a:lstStyle/>
+          <a:p>
+            <a:pPr marL="0" lvl="0" indent="0" algn="l" rtl="0">
+              <a:spcBef>
+                <a:spcPts val="0"/>
+              </a:spcBef>
+              <a:spcAft>
+                <a:spcPts val="0"/>
+              </a:spcAft>
+              <a:buNone/>
+            </a:pPr>
+            <a:r>
+              <a:rPr lang="de" u="sng">
+                <a:solidFill>
+                  <a:schemeClr val="hlink"/>
+                </a:solidFill>
+                <a:hlinkClick r:id="rId3"/>
+              </a:rPr>
+              <a:t>https://ethereum.org/assets/#black-on-transparent-background</a:t>
+            </a:r>
+            <a:endParaRPr/>
+          </a:p>
+          <a:p>
+            <a:pPr marL="0" lvl="0" indent="0" algn="l" rtl="0">
+              <a:spcBef>
+                <a:spcPts val="0"/>
+              </a:spcBef>
+              <a:spcAft>
+                <a:spcPts val="0"/>
+              </a:spcAft>
+              <a:buNone/>
+            </a:pPr>
+            <a:r>
+              <a:rPr lang="de" u="sng">
+                <a:solidFill>
+                  <a:schemeClr val="hlink"/>
+                </a:solidFill>
+                <a:hlinkClick r:id="rId4"/>
+              </a:rPr>
+              <a:t>https://daiki-sekiguchi.com/2018/08/08/ethereum-what-is-ganache/</a:t>
+            </a:r>
+            <a:endParaRPr/>
+          </a:p>
+          <a:p>
+            <a:pPr marL="0" lvl="0" indent="0" algn="l" rtl="0">
+              <a:spcBef>
+                <a:spcPts val="0"/>
+              </a:spcBef>
+              <a:spcAft>
+                <a:spcPts val="0"/>
+              </a:spcAft>
+              <a:buNone/>
+            </a:pPr>
+            <a:r>
+              <a:rPr lang="de" u="sng">
+                <a:solidFill>
+                  <a:schemeClr val="hlink"/>
+                </a:solidFill>
+                <a:hlinkClick r:id="rId5"/>
+              </a:rPr>
+              <a:t>https://solidity.readthedocs.io/en/v0.6.6/</a:t>
+            </a:r>
+            <a:endParaRPr/>
+          </a:p>
+          <a:p>
+            <a:pPr marL="0" lvl="0" indent="0" algn="l" rtl="0">
+              <a:spcBef>
+                <a:spcPts val="0"/>
+              </a:spcBef>
+              <a:spcAft>
+                <a:spcPts val="0"/>
+              </a:spcAft>
+              <a:buNone/>
+            </a:pPr>
+            <a:endParaRPr/>
+          </a:p>
+          <a:p>
+            <a:pPr marL="0" lvl="0" indent="0" algn="l" rtl="0">
+              <a:spcBef>
+                <a:spcPts val="0"/>
+              </a:spcBef>
+              <a:spcAft>
+                <a:spcPts val="0"/>
+              </a:spcAft>
+              <a:buNone/>
+            </a:pPr>
+            <a:endParaRPr/>
+          </a:p>
+        </p:txBody>
+      </p:sp>
+    </p:spTree>
+  </p:cSld>
+  <p:clrMapOvr>
+    <a:masterClrMapping/>
+  </p:clrMapOvr>
+</p:notes>
+</file>
+
+<file path=ppt/notesSlides/notesSlide24.xml><?xml version="1.0" encoding="utf-8"?>
+<p:notes xmlns:a="http://schemas.openxmlformats.org/drawingml/2006/main" xmlns:r="http://schemas.openxmlformats.org/officeDocument/2006/relationships" xmlns:p="http://schemas.openxmlformats.org/presentationml/2006/main" showMasterSp="0" showMasterPhAnim="0">
+  <p:cSld>
+    <p:spTree>
+      <p:nvGrpSpPr>
+        <p:cNvPr id="1" name="Shape 113"/>
+        <p:cNvGrpSpPr/>
+        <p:nvPr/>
+      </p:nvGrpSpPr>
+      <p:grpSpPr>
+        <a:xfrm>
+          <a:off x="0" y="0"/>
+          <a:ext cx="0" cy="0"/>
+          <a:chOff x="0" y="0"/>
+          <a:chExt cx="0" cy="0"/>
+        </a:xfrm>
+      </p:grpSpPr>
+      <p:sp>
+        <p:nvSpPr>
+          <p:cNvPr id="114" name="Google Shape;114;g7459a94ec7_1_4:notes"/>
+          <p:cNvSpPr>
+            <a:spLocks noGrp="1" noRot="1" noChangeAspect="1"/>
+          </p:cNvSpPr>
+          <p:nvPr>
+            <p:ph type="sldImg" idx="2"/>
+          </p:nvPr>
+        </p:nvSpPr>
+        <p:spPr>
+          <a:xfrm>
+            <a:off x="381000" y="685800"/>
+            <a:ext cx="6096000" cy="3429000"/>
+          </a:xfrm>
+          <a:custGeom>
+            <a:avLst/>
+            <a:gdLst/>
+            <a:ahLst/>
+            <a:cxnLst/>
+            <a:rect l="l" t="t" r="r" b="b"/>
+            <a:pathLst>
+              <a:path w="120000" h="120000" extrusionOk="0">
+                <a:moveTo>
+                  <a:pt x="0" y="0"/>
+                </a:moveTo>
+                <a:lnTo>
+                  <a:pt x="120000" y="0"/>
+                </a:lnTo>
+                <a:lnTo>
+                  <a:pt x="120000" y="120000"/>
+                </a:lnTo>
+                <a:lnTo>
+                  <a:pt x="0" y="120000"/>
+                </a:lnTo>
+                <a:close/>
+              </a:path>
+            </a:pathLst>
+          </a:custGeom>
+        </p:spPr>
+      </p:sp>
+      <p:sp>
+        <p:nvSpPr>
+          <p:cNvPr id="115" name="Google Shape;115;g7459a94ec7_1_4:notes"/>
+          <p:cNvSpPr txBox="1">
+            <a:spLocks noGrp="1"/>
+          </p:cNvSpPr>
+          <p:nvPr>
+            <p:ph type="body" idx="1"/>
+          </p:nvPr>
+        </p:nvSpPr>
+        <p:spPr>
+          <a:xfrm>
+            <a:off x="685800" y="4343400"/>
+            <a:ext cx="5486400" cy="4114800"/>
+          </a:xfrm>
+          <a:prstGeom prst="rect">
+            <a:avLst/>
+          </a:prstGeom>
+        </p:spPr>
+        <p:txBody>
+          <a:bodyPr spcFirstLastPara="1" wrap="square" lIns="91425" tIns="91425" rIns="91425" bIns="91425" anchor="t" anchorCtr="0">
+            <a:noAutofit/>
+          </a:bodyPr>
+          <a:lstStyle/>
+          <a:p>
+            <a:pPr marL="0" lvl="0" indent="0" algn="l" rtl="0">
+              <a:spcBef>
+                <a:spcPts val="0"/>
+              </a:spcBef>
+              <a:spcAft>
+                <a:spcPts val="0"/>
+              </a:spcAft>
+              <a:buNone/>
+            </a:pPr>
+            <a:endParaRPr/>
+          </a:p>
+        </p:txBody>
+      </p:sp>
+    </p:spTree>
+  </p:cSld>
+  <p:clrMapOvr>
+    <a:masterClrMapping/>
+  </p:clrMapOvr>
+</p:notes>
+</file>
+
+<file path=ppt/notesSlides/notesSlide25.xml><?xml version="1.0" encoding="utf-8"?>
 <p:notes xmlns:a="http://schemas.openxmlformats.org/drawingml/2006/main" xmlns:r="http://schemas.openxmlformats.org/officeDocument/2006/relationships" xmlns:p="http://schemas.openxmlformats.org/presentationml/2006/main" showMasterSp="0" showMasterPhAnim="0">
   <p:cSld>
     <p:spTree>
@@ -2459,7 +3311,7 @@
 </p:notes>
 </file>
 
-<file path=ppt/notesSlides/notesSlide21.xml><?xml version="1.0" encoding="utf-8"?>
+<file path=ppt/notesSlides/notesSlide26.xml><?xml version="1.0" encoding="utf-8"?>
 <p:notes xmlns:a="http://schemas.openxmlformats.org/drawingml/2006/main" xmlns:r="http://schemas.openxmlformats.org/officeDocument/2006/relationships" xmlns:p="http://schemas.openxmlformats.org/presentationml/2006/main" showMasterSp="0" showMasterPhAnim="0">
   <p:cSld>
     <p:spTree>
@@ -2563,7 +3415,7 @@
 </p:notes>
 </file>
 
-<file path=ppt/notesSlides/notesSlide22.xml><?xml version="1.0" encoding="utf-8"?>
+<file path=ppt/notesSlides/notesSlide27.xml><?xml version="1.0" encoding="utf-8"?>
 <p:notes xmlns:a="http://schemas.openxmlformats.org/drawingml/2006/main" xmlns:r="http://schemas.openxmlformats.org/officeDocument/2006/relationships" xmlns:p="http://schemas.openxmlformats.org/presentationml/2006/main" showMasterSp="0" showMasterPhAnim="0">
   <p:cSld>
     <p:spTree>
@@ -2667,7 +3519,7 @@
 </p:notes>
 </file>
 
-<file path=ppt/notesSlides/notesSlide23.xml><?xml version="1.0" encoding="utf-8"?>
+<file path=ppt/notesSlides/notesSlide28.xml><?xml version="1.0" encoding="utf-8"?>
 <p:notes xmlns:a="http://schemas.openxmlformats.org/drawingml/2006/main" xmlns:r="http://schemas.openxmlformats.org/officeDocument/2006/relationships" xmlns:p="http://schemas.openxmlformats.org/presentationml/2006/main" showMasterSp="0" showMasterPhAnim="0">
   <p:cSld>
     <p:spTree>
@@ -2771,7 +3623,7 @@
 </p:notes>
 </file>
 
-<file path=ppt/notesSlides/notesSlide24.xml><?xml version="1.0" encoding="utf-8"?>
+<file path=ppt/notesSlides/notesSlide29.xml><?xml version="1.0" encoding="utf-8"?>
 <p:notes xmlns:a="http://schemas.openxmlformats.org/drawingml/2006/main" xmlns:r="http://schemas.openxmlformats.org/officeDocument/2006/relationships" xmlns:p="http://schemas.openxmlformats.org/presentationml/2006/main" showMasterSp="0" showMasterPhAnim="0">
   <p:cSld>
     <p:spTree>
@@ -2832,526 +3684,6 @@
       <p:sp>
         <p:nvSpPr>
           <p:cNvPr id="167" name="Google Shape;167;g7459a94ec7_0_50:notes"/>
-          <p:cNvSpPr txBox="1">
-            <a:spLocks noGrp="1"/>
-          </p:cNvSpPr>
-          <p:nvPr>
-            <p:ph type="body" idx="1"/>
-          </p:nvPr>
-        </p:nvSpPr>
-        <p:spPr>
-          <a:xfrm>
-            <a:off x="685800" y="4343400"/>
-            <a:ext cx="5486400" cy="4114800"/>
-          </a:xfrm>
-          <a:prstGeom prst="rect">
-            <a:avLst/>
-          </a:prstGeom>
-        </p:spPr>
-        <p:txBody>
-          <a:bodyPr spcFirstLastPara="1" wrap="square" lIns="91425" tIns="91425" rIns="91425" bIns="91425" anchor="t" anchorCtr="0">
-            <a:noAutofit/>
-          </a:bodyPr>
-          <a:lstStyle/>
-          <a:p>
-            <a:pPr marL="0" lvl="0" indent="0" algn="l" rtl="0">
-              <a:spcBef>
-                <a:spcPts val="0"/>
-              </a:spcBef>
-              <a:spcAft>
-                <a:spcPts val="0"/>
-              </a:spcAft>
-              <a:buNone/>
-            </a:pPr>
-            <a:endParaRPr/>
-          </a:p>
-        </p:txBody>
-      </p:sp>
-    </p:spTree>
-  </p:cSld>
-  <p:clrMapOvr>
-    <a:masterClrMapping/>
-  </p:clrMapOvr>
-</p:notes>
-</file>
-
-<file path=ppt/notesSlides/notesSlide25.xml><?xml version="1.0" encoding="utf-8"?>
-<p:notes xmlns:a="http://schemas.openxmlformats.org/drawingml/2006/main" xmlns:r="http://schemas.openxmlformats.org/officeDocument/2006/relationships" xmlns:p="http://schemas.openxmlformats.org/presentationml/2006/main" showMasterSp="0" showMasterPhAnim="0">
-  <p:cSld>
-    <p:spTree>
-      <p:nvGrpSpPr>
-        <p:cNvPr id="1" name="Shape 171"/>
-        <p:cNvGrpSpPr/>
-        <p:nvPr/>
-      </p:nvGrpSpPr>
-      <p:grpSpPr>
-        <a:xfrm>
-          <a:off x="0" y="0"/>
-          <a:ext cx="0" cy="0"/>
-          <a:chOff x="0" y="0"/>
-          <a:chExt cx="0" cy="0"/>
-        </a:xfrm>
-      </p:grpSpPr>
-      <p:sp>
-        <p:nvSpPr>
-          <p:cNvPr id="172" name="Google Shape;172;g83e1e28387_3_81:notes"/>
-          <p:cNvSpPr>
-            <a:spLocks noGrp="1" noRot="1" noChangeAspect="1"/>
-          </p:cNvSpPr>
-          <p:nvPr>
-            <p:ph type="sldImg" idx="2"/>
-          </p:nvPr>
-        </p:nvSpPr>
-        <p:spPr>
-          <a:xfrm>
-            <a:off x="381000" y="685800"/>
-            <a:ext cx="6096000" cy="3429000"/>
-          </a:xfrm>
-          <a:custGeom>
-            <a:avLst/>
-            <a:gdLst/>
-            <a:ahLst/>
-            <a:cxnLst/>
-            <a:rect l="l" t="t" r="r" b="b"/>
-            <a:pathLst>
-              <a:path w="120000" h="120000" extrusionOk="0">
-                <a:moveTo>
-                  <a:pt x="0" y="0"/>
-                </a:moveTo>
-                <a:lnTo>
-                  <a:pt x="120000" y="0"/>
-                </a:lnTo>
-                <a:lnTo>
-                  <a:pt x="120000" y="120000"/>
-                </a:lnTo>
-                <a:lnTo>
-                  <a:pt x="0" y="120000"/>
-                </a:lnTo>
-                <a:close/>
-              </a:path>
-            </a:pathLst>
-          </a:custGeom>
-        </p:spPr>
-      </p:sp>
-      <p:sp>
-        <p:nvSpPr>
-          <p:cNvPr id="173" name="Google Shape;173;g83e1e28387_3_81:notes"/>
-          <p:cNvSpPr txBox="1">
-            <a:spLocks noGrp="1"/>
-          </p:cNvSpPr>
-          <p:nvPr>
-            <p:ph type="body" idx="1"/>
-          </p:nvPr>
-        </p:nvSpPr>
-        <p:spPr>
-          <a:xfrm>
-            <a:off x="685800" y="4343400"/>
-            <a:ext cx="5486400" cy="4114800"/>
-          </a:xfrm>
-          <a:prstGeom prst="rect">
-            <a:avLst/>
-          </a:prstGeom>
-        </p:spPr>
-        <p:txBody>
-          <a:bodyPr spcFirstLastPara="1" wrap="square" lIns="91425" tIns="91425" rIns="91425" bIns="91425" anchor="t" anchorCtr="0">
-            <a:noAutofit/>
-          </a:bodyPr>
-          <a:lstStyle/>
-          <a:p>
-            <a:pPr marL="0" lvl="0" indent="0" algn="l" rtl="0">
-              <a:spcBef>
-                <a:spcPts val="0"/>
-              </a:spcBef>
-              <a:spcAft>
-                <a:spcPts val="0"/>
-              </a:spcAft>
-              <a:buNone/>
-            </a:pPr>
-            <a:endParaRPr/>
-          </a:p>
-        </p:txBody>
-      </p:sp>
-    </p:spTree>
-  </p:cSld>
-  <p:clrMapOvr>
-    <a:masterClrMapping/>
-  </p:clrMapOvr>
-</p:notes>
-</file>
-
-<file path=ppt/notesSlides/notesSlide26.xml><?xml version="1.0" encoding="utf-8"?>
-<p:notes xmlns:a="http://schemas.openxmlformats.org/drawingml/2006/main" xmlns:r="http://schemas.openxmlformats.org/officeDocument/2006/relationships" xmlns:p="http://schemas.openxmlformats.org/presentationml/2006/main" showMasterSp="0" showMasterPhAnim="0">
-  <p:cSld>
-    <p:spTree>
-      <p:nvGrpSpPr>
-        <p:cNvPr id="1" name="Shape 179"/>
-        <p:cNvGrpSpPr/>
-        <p:nvPr/>
-      </p:nvGrpSpPr>
-      <p:grpSpPr>
-        <a:xfrm>
-          <a:off x="0" y="0"/>
-          <a:ext cx="0" cy="0"/>
-          <a:chOff x="0" y="0"/>
-          <a:chExt cx="0" cy="0"/>
-        </a:xfrm>
-      </p:grpSpPr>
-      <p:sp>
-        <p:nvSpPr>
-          <p:cNvPr id="180" name="Google Shape;180;g83e1e28387_3_1:notes"/>
-          <p:cNvSpPr>
-            <a:spLocks noGrp="1" noRot="1" noChangeAspect="1"/>
-          </p:cNvSpPr>
-          <p:nvPr>
-            <p:ph type="sldImg" idx="2"/>
-          </p:nvPr>
-        </p:nvSpPr>
-        <p:spPr>
-          <a:xfrm>
-            <a:off x="381000" y="685800"/>
-            <a:ext cx="6096000" cy="3429000"/>
-          </a:xfrm>
-          <a:custGeom>
-            <a:avLst/>
-            <a:gdLst/>
-            <a:ahLst/>
-            <a:cxnLst/>
-            <a:rect l="l" t="t" r="r" b="b"/>
-            <a:pathLst>
-              <a:path w="120000" h="120000" extrusionOk="0">
-                <a:moveTo>
-                  <a:pt x="0" y="0"/>
-                </a:moveTo>
-                <a:lnTo>
-                  <a:pt x="120000" y="0"/>
-                </a:lnTo>
-                <a:lnTo>
-                  <a:pt x="120000" y="120000"/>
-                </a:lnTo>
-                <a:lnTo>
-                  <a:pt x="0" y="120000"/>
-                </a:lnTo>
-                <a:close/>
-              </a:path>
-            </a:pathLst>
-          </a:custGeom>
-        </p:spPr>
-      </p:sp>
-      <p:sp>
-        <p:nvSpPr>
-          <p:cNvPr id="181" name="Google Shape;181;g83e1e28387_3_1:notes"/>
-          <p:cNvSpPr txBox="1">
-            <a:spLocks noGrp="1"/>
-          </p:cNvSpPr>
-          <p:nvPr>
-            <p:ph type="body" idx="1"/>
-          </p:nvPr>
-        </p:nvSpPr>
-        <p:spPr>
-          <a:xfrm>
-            <a:off x="685800" y="4343400"/>
-            <a:ext cx="5486400" cy="4114800"/>
-          </a:xfrm>
-          <a:prstGeom prst="rect">
-            <a:avLst/>
-          </a:prstGeom>
-        </p:spPr>
-        <p:txBody>
-          <a:bodyPr spcFirstLastPara="1" wrap="square" lIns="91425" tIns="91425" rIns="91425" bIns="91425" anchor="t" anchorCtr="0">
-            <a:noAutofit/>
-          </a:bodyPr>
-          <a:lstStyle/>
-          <a:p>
-            <a:pPr marL="0" lvl="0" indent="0" algn="l" rtl="0">
-              <a:spcBef>
-                <a:spcPts val="0"/>
-              </a:spcBef>
-              <a:spcAft>
-                <a:spcPts val="0"/>
-              </a:spcAft>
-              <a:buNone/>
-            </a:pPr>
-            <a:endParaRPr/>
-          </a:p>
-        </p:txBody>
-      </p:sp>
-    </p:spTree>
-  </p:cSld>
-  <p:clrMapOvr>
-    <a:masterClrMapping/>
-  </p:clrMapOvr>
-</p:notes>
-</file>
-
-<file path=ppt/notesSlides/notesSlide27.xml><?xml version="1.0" encoding="utf-8"?>
-<p:notes xmlns:a="http://schemas.openxmlformats.org/drawingml/2006/main" xmlns:r="http://schemas.openxmlformats.org/officeDocument/2006/relationships" xmlns:p="http://schemas.openxmlformats.org/presentationml/2006/main" showMasterSp="0" showMasterPhAnim="0">
-  <p:cSld>
-    <p:spTree>
-      <p:nvGrpSpPr>
-        <p:cNvPr id="1" name="Shape 187"/>
-        <p:cNvGrpSpPr/>
-        <p:nvPr/>
-      </p:nvGrpSpPr>
-      <p:grpSpPr>
-        <a:xfrm>
-          <a:off x="0" y="0"/>
-          <a:ext cx="0" cy="0"/>
-          <a:chOff x="0" y="0"/>
-          <a:chExt cx="0" cy="0"/>
-        </a:xfrm>
-      </p:grpSpPr>
-      <p:sp>
-        <p:nvSpPr>
-          <p:cNvPr id="188" name="Google Shape;188;g83e1e28387_3_64:notes"/>
-          <p:cNvSpPr>
-            <a:spLocks noGrp="1" noRot="1" noChangeAspect="1"/>
-          </p:cNvSpPr>
-          <p:nvPr>
-            <p:ph type="sldImg" idx="2"/>
-          </p:nvPr>
-        </p:nvSpPr>
-        <p:spPr>
-          <a:xfrm>
-            <a:off x="381000" y="685800"/>
-            <a:ext cx="6096000" cy="3429000"/>
-          </a:xfrm>
-          <a:custGeom>
-            <a:avLst/>
-            <a:gdLst/>
-            <a:ahLst/>
-            <a:cxnLst/>
-            <a:rect l="l" t="t" r="r" b="b"/>
-            <a:pathLst>
-              <a:path w="120000" h="120000" extrusionOk="0">
-                <a:moveTo>
-                  <a:pt x="0" y="0"/>
-                </a:moveTo>
-                <a:lnTo>
-                  <a:pt x="120000" y="0"/>
-                </a:lnTo>
-                <a:lnTo>
-                  <a:pt x="120000" y="120000"/>
-                </a:lnTo>
-                <a:lnTo>
-                  <a:pt x="0" y="120000"/>
-                </a:lnTo>
-                <a:close/>
-              </a:path>
-            </a:pathLst>
-          </a:custGeom>
-        </p:spPr>
-      </p:sp>
-      <p:sp>
-        <p:nvSpPr>
-          <p:cNvPr id="189" name="Google Shape;189;g83e1e28387_3_64:notes"/>
-          <p:cNvSpPr txBox="1">
-            <a:spLocks noGrp="1"/>
-          </p:cNvSpPr>
-          <p:nvPr>
-            <p:ph type="body" idx="1"/>
-          </p:nvPr>
-        </p:nvSpPr>
-        <p:spPr>
-          <a:xfrm>
-            <a:off x="685800" y="4343400"/>
-            <a:ext cx="5486400" cy="4114800"/>
-          </a:xfrm>
-          <a:prstGeom prst="rect">
-            <a:avLst/>
-          </a:prstGeom>
-        </p:spPr>
-        <p:txBody>
-          <a:bodyPr spcFirstLastPara="1" wrap="square" lIns="91425" tIns="91425" rIns="91425" bIns="91425" anchor="t" anchorCtr="0">
-            <a:noAutofit/>
-          </a:bodyPr>
-          <a:lstStyle/>
-          <a:p>
-            <a:pPr marL="0" lvl="0" indent="0" algn="l" rtl="0">
-              <a:spcBef>
-                <a:spcPts val="0"/>
-              </a:spcBef>
-              <a:spcAft>
-                <a:spcPts val="0"/>
-              </a:spcAft>
-              <a:buNone/>
-            </a:pPr>
-            <a:endParaRPr/>
-          </a:p>
-        </p:txBody>
-      </p:sp>
-    </p:spTree>
-  </p:cSld>
-  <p:clrMapOvr>
-    <a:masterClrMapping/>
-  </p:clrMapOvr>
-</p:notes>
-</file>
-
-<file path=ppt/notesSlides/notesSlide28.xml><?xml version="1.0" encoding="utf-8"?>
-<p:notes xmlns:a="http://schemas.openxmlformats.org/drawingml/2006/main" xmlns:r="http://schemas.openxmlformats.org/officeDocument/2006/relationships" xmlns:p="http://schemas.openxmlformats.org/presentationml/2006/main" showMasterSp="0" showMasterPhAnim="0">
-  <p:cSld>
-    <p:spTree>
-      <p:nvGrpSpPr>
-        <p:cNvPr id="1" name="Shape 194"/>
-        <p:cNvGrpSpPr/>
-        <p:nvPr/>
-      </p:nvGrpSpPr>
-      <p:grpSpPr>
-        <a:xfrm>
-          <a:off x="0" y="0"/>
-          <a:ext cx="0" cy="0"/>
-          <a:chOff x="0" y="0"/>
-          <a:chExt cx="0" cy="0"/>
-        </a:xfrm>
-      </p:grpSpPr>
-      <p:sp>
-        <p:nvSpPr>
-          <p:cNvPr id="195" name="Google Shape;195;g83e1e28387_3_6:notes"/>
-          <p:cNvSpPr>
-            <a:spLocks noGrp="1" noRot="1" noChangeAspect="1"/>
-          </p:cNvSpPr>
-          <p:nvPr>
-            <p:ph type="sldImg" idx="2"/>
-          </p:nvPr>
-        </p:nvSpPr>
-        <p:spPr>
-          <a:xfrm>
-            <a:off x="381000" y="685800"/>
-            <a:ext cx="6096000" cy="3429000"/>
-          </a:xfrm>
-          <a:custGeom>
-            <a:avLst/>
-            <a:gdLst/>
-            <a:ahLst/>
-            <a:cxnLst/>
-            <a:rect l="l" t="t" r="r" b="b"/>
-            <a:pathLst>
-              <a:path w="120000" h="120000" extrusionOk="0">
-                <a:moveTo>
-                  <a:pt x="0" y="0"/>
-                </a:moveTo>
-                <a:lnTo>
-                  <a:pt x="120000" y="0"/>
-                </a:lnTo>
-                <a:lnTo>
-                  <a:pt x="120000" y="120000"/>
-                </a:lnTo>
-                <a:lnTo>
-                  <a:pt x="0" y="120000"/>
-                </a:lnTo>
-                <a:close/>
-              </a:path>
-            </a:pathLst>
-          </a:custGeom>
-        </p:spPr>
-      </p:sp>
-      <p:sp>
-        <p:nvSpPr>
-          <p:cNvPr id="196" name="Google Shape;196;g83e1e28387_3_6:notes"/>
-          <p:cNvSpPr txBox="1">
-            <a:spLocks noGrp="1"/>
-          </p:cNvSpPr>
-          <p:nvPr>
-            <p:ph type="body" idx="1"/>
-          </p:nvPr>
-        </p:nvSpPr>
-        <p:spPr>
-          <a:xfrm>
-            <a:off x="685800" y="4343400"/>
-            <a:ext cx="5486400" cy="4114800"/>
-          </a:xfrm>
-          <a:prstGeom prst="rect">
-            <a:avLst/>
-          </a:prstGeom>
-        </p:spPr>
-        <p:txBody>
-          <a:bodyPr spcFirstLastPara="1" wrap="square" lIns="91425" tIns="91425" rIns="91425" bIns="91425" anchor="t" anchorCtr="0">
-            <a:noAutofit/>
-          </a:bodyPr>
-          <a:lstStyle/>
-          <a:p>
-            <a:pPr marL="0" lvl="0" indent="0" algn="l" rtl="0">
-              <a:spcBef>
-                <a:spcPts val="0"/>
-              </a:spcBef>
-              <a:spcAft>
-                <a:spcPts val="0"/>
-              </a:spcAft>
-              <a:buNone/>
-            </a:pPr>
-            <a:endParaRPr/>
-          </a:p>
-        </p:txBody>
-      </p:sp>
-    </p:spTree>
-  </p:cSld>
-  <p:clrMapOvr>
-    <a:masterClrMapping/>
-  </p:clrMapOvr>
-</p:notes>
-</file>
-
-<file path=ppt/notesSlides/notesSlide29.xml><?xml version="1.0" encoding="utf-8"?>
-<p:notes xmlns:a="http://schemas.openxmlformats.org/drawingml/2006/main" xmlns:r="http://schemas.openxmlformats.org/officeDocument/2006/relationships" xmlns:p="http://schemas.openxmlformats.org/presentationml/2006/main" showMasterSp="0" showMasterPhAnim="0">
-  <p:cSld>
-    <p:spTree>
-      <p:nvGrpSpPr>
-        <p:cNvPr id="1" name="Shape 201"/>
-        <p:cNvGrpSpPr/>
-        <p:nvPr/>
-      </p:nvGrpSpPr>
-      <p:grpSpPr>
-        <a:xfrm>
-          <a:off x="0" y="0"/>
-          <a:ext cx="0" cy="0"/>
-          <a:chOff x="0" y="0"/>
-          <a:chExt cx="0" cy="0"/>
-        </a:xfrm>
-      </p:grpSpPr>
-      <p:sp>
-        <p:nvSpPr>
-          <p:cNvPr id="202" name="Google Shape;202;g7459a94ec7_0_55:notes"/>
-          <p:cNvSpPr>
-            <a:spLocks noGrp="1" noRot="1" noChangeAspect="1"/>
-          </p:cNvSpPr>
-          <p:nvPr>
-            <p:ph type="sldImg" idx="2"/>
-          </p:nvPr>
-        </p:nvSpPr>
-        <p:spPr>
-          <a:xfrm>
-            <a:off x="381000" y="685800"/>
-            <a:ext cx="6096000" cy="3429000"/>
-          </a:xfrm>
-          <a:custGeom>
-            <a:avLst/>
-            <a:gdLst/>
-            <a:ahLst/>
-            <a:cxnLst/>
-            <a:rect l="l" t="t" r="r" b="b"/>
-            <a:pathLst>
-              <a:path w="120000" h="120000" extrusionOk="0">
-                <a:moveTo>
-                  <a:pt x="0" y="0"/>
-                </a:moveTo>
-                <a:lnTo>
-                  <a:pt x="120000" y="0"/>
-                </a:lnTo>
-                <a:lnTo>
-                  <a:pt x="120000" y="120000"/>
-                </a:lnTo>
-                <a:lnTo>
-                  <a:pt x="0" y="120000"/>
-                </a:lnTo>
-                <a:close/>
-              </a:path>
-            </a:pathLst>
-          </a:custGeom>
-        </p:spPr>
-      </p:sp>
-      <p:sp>
-        <p:nvSpPr>
-          <p:cNvPr id="203" name="Google Shape;203;g7459a94ec7_0_55:notes"/>
           <p:cNvSpPr txBox="1">
             <a:spLocks noGrp="1"/>
           </p:cNvSpPr>
@@ -3487,7 +3819,33 @@
               </a:spcAft>
               <a:buNone/>
             </a:pPr>
-            <a:endParaRPr/>
+            <a:r>
+              <a:rPr lang="de-DE" dirty="0"/>
+              <a:t>Zunächst aber nun zur Aufgabe:</a:t>
+            </a:r>
+            <a:br>
+              <a:rPr lang="de-DE" dirty="0"/>
+            </a:br>
+            <a:r>
+              <a:rPr lang="de-DE" dirty="0"/>
+              <a:t>Im groben Rahmen, war gewünscht, dass wir Mietvorgänge über die Blockchain verwalten.</a:t>
+            </a:r>
+          </a:p>
+          <a:p>
+            <a:pPr marL="0" lvl="0" indent="0" algn="l" rtl="0">
+              <a:spcBef>
+                <a:spcPts val="0"/>
+              </a:spcBef>
+              <a:spcAft>
+                <a:spcPts val="0"/>
+              </a:spcAft>
+              <a:buNone/>
+            </a:pPr>
+            <a:r>
+              <a:rPr lang="de-DE" dirty="0"/>
+              <a:t>Nach der anfänglichen Idee, Wohnungen oder Häuser entsprechend zu vermieten, hatten wir uns entschlossen, auf Fahrzeuge umzuschwenken und mit unserem Projekt „Carsharing via Blockchain“ zu erfinden.</a:t>
+            </a:r>
+            <a:endParaRPr dirty="0"/>
           </a:p>
         </p:txBody>
       </p:sp>
@@ -3500,6 +3858,526 @@
 </file>
 
 <file path=ppt/notesSlides/notesSlide30.xml><?xml version="1.0" encoding="utf-8"?>
+<p:notes xmlns:a="http://schemas.openxmlformats.org/drawingml/2006/main" xmlns:r="http://schemas.openxmlformats.org/officeDocument/2006/relationships" xmlns:p="http://schemas.openxmlformats.org/presentationml/2006/main" showMasterSp="0" showMasterPhAnim="0">
+  <p:cSld>
+    <p:spTree>
+      <p:nvGrpSpPr>
+        <p:cNvPr id="1" name="Shape 171"/>
+        <p:cNvGrpSpPr/>
+        <p:nvPr/>
+      </p:nvGrpSpPr>
+      <p:grpSpPr>
+        <a:xfrm>
+          <a:off x="0" y="0"/>
+          <a:ext cx="0" cy="0"/>
+          <a:chOff x="0" y="0"/>
+          <a:chExt cx="0" cy="0"/>
+        </a:xfrm>
+      </p:grpSpPr>
+      <p:sp>
+        <p:nvSpPr>
+          <p:cNvPr id="172" name="Google Shape;172;g83e1e28387_3_81:notes"/>
+          <p:cNvSpPr>
+            <a:spLocks noGrp="1" noRot="1" noChangeAspect="1"/>
+          </p:cNvSpPr>
+          <p:nvPr>
+            <p:ph type="sldImg" idx="2"/>
+          </p:nvPr>
+        </p:nvSpPr>
+        <p:spPr>
+          <a:xfrm>
+            <a:off x="381000" y="685800"/>
+            <a:ext cx="6096000" cy="3429000"/>
+          </a:xfrm>
+          <a:custGeom>
+            <a:avLst/>
+            <a:gdLst/>
+            <a:ahLst/>
+            <a:cxnLst/>
+            <a:rect l="l" t="t" r="r" b="b"/>
+            <a:pathLst>
+              <a:path w="120000" h="120000" extrusionOk="0">
+                <a:moveTo>
+                  <a:pt x="0" y="0"/>
+                </a:moveTo>
+                <a:lnTo>
+                  <a:pt x="120000" y="0"/>
+                </a:lnTo>
+                <a:lnTo>
+                  <a:pt x="120000" y="120000"/>
+                </a:lnTo>
+                <a:lnTo>
+                  <a:pt x="0" y="120000"/>
+                </a:lnTo>
+                <a:close/>
+              </a:path>
+            </a:pathLst>
+          </a:custGeom>
+        </p:spPr>
+      </p:sp>
+      <p:sp>
+        <p:nvSpPr>
+          <p:cNvPr id="173" name="Google Shape;173;g83e1e28387_3_81:notes"/>
+          <p:cNvSpPr txBox="1">
+            <a:spLocks noGrp="1"/>
+          </p:cNvSpPr>
+          <p:nvPr>
+            <p:ph type="body" idx="1"/>
+          </p:nvPr>
+        </p:nvSpPr>
+        <p:spPr>
+          <a:xfrm>
+            <a:off x="685800" y="4343400"/>
+            <a:ext cx="5486400" cy="4114800"/>
+          </a:xfrm>
+          <a:prstGeom prst="rect">
+            <a:avLst/>
+          </a:prstGeom>
+        </p:spPr>
+        <p:txBody>
+          <a:bodyPr spcFirstLastPara="1" wrap="square" lIns="91425" tIns="91425" rIns="91425" bIns="91425" anchor="t" anchorCtr="0">
+            <a:noAutofit/>
+          </a:bodyPr>
+          <a:lstStyle/>
+          <a:p>
+            <a:pPr marL="0" lvl="0" indent="0" algn="l" rtl="0">
+              <a:spcBef>
+                <a:spcPts val="0"/>
+              </a:spcBef>
+              <a:spcAft>
+                <a:spcPts val="0"/>
+              </a:spcAft>
+              <a:buNone/>
+            </a:pPr>
+            <a:endParaRPr/>
+          </a:p>
+        </p:txBody>
+      </p:sp>
+    </p:spTree>
+  </p:cSld>
+  <p:clrMapOvr>
+    <a:masterClrMapping/>
+  </p:clrMapOvr>
+</p:notes>
+</file>
+
+<file path=ppt/notesSlides/notesSlide31.xml><?xml version="1.0" encoding="utf-8"?>
+<p:notes xmlns:a="http://schemas.openxmlformats.org/drawingml/2006/main" xmlns:r="http://schemas.openxmlformats.org/officeDocument/2006/relationships" xmlns:p="http://schemas.openxmlformats.org/presentationml/2006/main" showMasterSp="0" showMasterPhAnim="0">
+  <p:cSld>
+    <p:spTree>
+      <p:nvGrpSpPr>
+        <p:cNvPr id="1" name="Shape 179"/>
+        <p:cNvGrpSpPr/>
+        <p:nvPr/>
+      </p:nvGrpSpPr>
+      <p:grpSpPr>
+        <a:xfrm>
+          <a:off x="0" y="0"/>
+          <a:ext cx="0" cy="0"/>
+          <a:chOff x="0" y="0"/>
+          <a:chExt cx="0" cy="0"/>
+        </a:xfrm>
+      </p:grpSpPr>
+      <p:sp>
+        <p:nvSpPr>
+          <p:cNvPr id="180" name="Google Shape;180;g83e1e28387_3_1:notes"/>
+          <p:cNvSpPr>
+            <a:spLocks noGrp="1" noRot="1" noChangeAspect="1"/>
+          </p:cNvSpPr>
+          <p:nvPr>
+            <p:ph type="sldImg" idx="2"/>
+          </p:nvPr>
+        </p:nvSpPr>
+        <p:spPr>
+          <a:xfrm>
+            <a:off x="381000" y="685800"/>
+            <a:ext cx="6096000" cy="3429000"/>
+          </a:xfrm>
+          <a:custGeom>
+            <a:avLst/>
+            <a:gdLst/>
+            <a:ahLst/>
+            <a:cxnLst/>
+            <a:rect l="l" t="t" r="r" b="b"/>
+            <a:pathLst>
+              <a:path w="120000" h="120000" extrusionOk="0">
+                <a:moveTo>
+                  <a:pt x="0" y="0"/>
+                </a:moveTo>
+                <a:lnTo>
+                  <a:pt x="120000" y="0"/>
+                </a:lnTo>
+                <a:lnTo>
+                  <a:pt x="120000" y="120000"/>
+                </a:lnTo>
+                <a:lnTo>
+                  <a:pt x="0" y="120000"/>
+                </a:lnTo>
+                <a:close/>
+              </a:path>
+            </a:pathLst>
+          </a:custGeom>
+        </p:spPr>
+      </p:sp>
+      <p:sp>
+        <p:nvSpPr>
+          <p:cNvPr id="181" name="Google Shape;181;g83e1e28387_3_1:notes"/>
+          <p:cNvSpPr txBox="1">
+            <a:spLocks noGrp="1"/>
+          </p:cNvSpPr>
+          <p:nvPr>
+            <p:ph type="body" idx="1"/>
+          </p:nvPr>
+        </p:nvSpPr>
+        <p:spPr>
+          <a:xfrm>
+            <a:off x="685800" y="4343400"/>
+            <a:ext cx="5486400" cy="4114800"/>
+          </a:xfrm>
+          <a:prstGeom prst="rect">
+            <a:avLst/>
+          </a:prstGeom>
+        </p:spPr>
+        <p:txBody>
+          <a:bodyPr spcFirstLastPara="1" wrap="square" lIns="91425" tIns="91425" rIns="91425" bIns="91425" anchor="t" anchorCtr="0">
+            <a:noAutofit/>
+          </a:bodyPr>
+          <a:lstStyle/>
+          <a:p>
+            <a:pPr marL="0" lvl="0" indent="0" algn="l" rtl="0">
+              <a:spcBef>
+                <a:spcPts val="0"/>
+              </a:spcBef>
+              <a:spcAft>
+                <a:spcPts val="0"/>
+              </a:spcAft>
+              <a:buNone/>
+            </a:pPr>
+            <a:endParaRPr/>
+          </a:p>
+        </p:txBody>
+      </p:sp>
+    </p:spTree>
+  </p:cSld>
+  <p:clrMapOvr>
+    <a:masterClrMapping/>
+  </p:clrMapOvr>
+</p:notes>
+</file>
+
+<file path=ppt/notesSlides/notesSlide32.xml><?xml version="1.0" encoding="utf-8"?>
+<p:notes xmlns:a="http://schemas.openxmlformats.org/drawingml/2006/main" xmlns:r="http://schemas.openxmlformats.org/officeDocument/2006/relationships" xmlns:p="http://schemas.openxmlformats.org/presentationml/2006/main" showMasterSp="0" showMasterPhAnim="0">
+  <p:cSld>
+    <p:spTree>
+      <p:nvGrpSpPr>
+        <p:cNvPr id="1" name="Shape 187"/>
+        <p:cNvGrpSpPr/>
+        <p:nvPr/>
+      </p:nvGrpSpPr>
+      <p:grpSpPr>
+        <a:xfrm>
+          <a:off x="0" y="0"/>
+          <a:ext cx="0" cy="0"/>
+          <a:chOff x="0" y="0"/>
+          <a:chExt cx="0" cy="0"/>
+        </a:xfrm>
+      </p:grpSpPr>
+      <p:sp>
+        <p:nvSpPr>
+          <p:cNvPr id="188" name="Google Shape;188;g83e1e28387_3_64:notes"/>
+          <p:cNvSpPr>
+            <a:spLocks noGrp="1" noRot="1" noChangeAspect="1"/>
+          </p:cNvSpPr>
+          <p:nvPr>
+            <p:ph type="sldImg" idx="2"/>
+          </p:nvPr>
+        </p:nvSpPr>
+        <p:spPr>
+          <a:xfrm>
+            <a:off x="381000" y="685800"/>
+            <a:ext cx="6096000" cy="3429000"/>
+          </a:xfrm>
+          <a:custGeom>
+            <a:avLst/>
+            <a:gdLst/>
+            <a:ahLst/>
+            <a:cxnLst/>
+            <a:rect l="l" t="t" r="r" b="b"/>
+            <a:pathLst>
+              <a:path w="120000" h="120000" extrusionOk="0">
+                <a:moveTo>
+                  <a:pt x="0" y="0"/>
+                </a:moveTo>
+                <a:lnTo>
+                  <a:pt x="120000" y="0"/>
+                </a:lnTo>
+                <a:lnTo>
+                  <a:pt x="120000" y="120000"/>
+                </a:lnTo>
+                <a:lnTo>
+                  <a:pt x="0" y="120000"/>
+                </a:lnTo>
+                <a:close/>
+              </a:path>
+            </a:pathLst>
+          </a:custGeom>
+        </p:spPr>
+      </p:sp>
+      <p:sp>
+        <p:nvSpPr>
+          <p:cNvPr id="189" name="Google Shape;189;g83e1e28387_3_64:notes"/>
+          <p:cNvSpPr txBox="1">
+            <a:spLocks noGrp="1"/>
+          </p:cNvSpPr>
+          <p:nvPr>
+            <p:ph type="body" idx="1"/>
+          </p:nvPr>
+        </p:nvSpPr>
+        <p:spPr>
+          <a:xfrm>
+            <a:off x="685800" y="4343400"/>
+            <a:ext cx="5486400" cy="4114800"/>
+          </a:xfrm>
+          <a:prstGeom prst="rect">
+            <a:avLst/>
+          </a:prstGeom>
+        </p:spPr>
+        <p:txBody>
+          <a:bodyPr spcFirstLastPara="1" wrap="square" lIns="91425" tIns="91425" rIns="91425" bIns="91425" anchor="t" anchorCtr="0">
+            <a:noAutofit/>
+          </a:bodyPr>
+          <a:lstStyle/>
+          <a:p>
+            <a:pPr marL="0" lvl="0" indent="0" algn="l" rtl="0">
+              <a:spcBef>
+                <a:spcPts val="0"/>
+              </a:spcBef>
+              <a:spcAft>
+                <a:spcPts val="0"/>
+              </a:spcAft>
+              <a:buNone/>
+            </a:pPr>
+            <a:endParaRPr/>
+          </a:p>
+        </p:txBody>
+      </p:sp>
+    </p:spTree>
+  </p:cSld>
+  <p:clrMapOvr>
+    <a:masterClrMapping/>
+  </p:clrMapOvr>
+</p:notes>
+</file>
+
+<file path=ppt/notesSlides/notesSlide33.xml><?xml version="1.0" encoding="utf-8"?>
+<p:notes xmlns:a="http://schemas.openxmlformats.org/drawingml/2006/main" xmlns:r="http://schemas.openxmlformats.org/officeDocument/2006/relationships" xmlns:p="http://schemas.openxmlformats.org/presentationml/2006/main" showMasterSp="0" showMasterPhAnim="0">
+  <p:cSld>
+    <p:spTree>
+      <p:nvGrpSpPr>
+        <p:cNvPr id="1" name="Shape 194"/>
+        <p:cNvGrpSpPr/>
+        <p:nvPr/>
+      </p:nvGrpSpPr>
+      <p:grpSpPr>
+        <a:xfrm>
+          <a:off x="0" y="0"/>
+          <a:ext cx="0" cy="0"/>
+          <a:chOff x="0" y="0"/>
+          <a:chExt cx="0" cy="0"/>
+        </a:xfrm>
+      </p:grpSpPr>
+      <p:sp>
+        <p:nvSpPr>
+          <p:cNvPr id="195" name="Google Shape;195;g83e1e28387_3_6:notes"/>
+          <p:cNvSpPr>
+            <a:spLocks noGrp="1" noRot="1" noChangeAspect="1"/>
+          </p:cNvSpPr>
+          <p:nvPr>
+            <p:ph type="sldImg" idx="2"/>
+          </p:nvPr>
+        </p:nvSpPr>
+        <p:spPr>
+          <a:xfrm>
+            <a:off x="381000" y="685800"/>
+            <a:ext cx="6096000" cy="3429000"/>
+          </a:xfrm>
+          <a:custGeom>
+            <a:avLst/>
+            <a:gdLst/>
+            <a:ahLst/>
+            <a:cxnLst/>
+            <a:rect l="l" t="t" r="r" b="b"/>
+            <a:pathLst>
+              <a:path w="120000" h="120000" extrusionOk="0">
+                <a:moveTo>
+                  <a:pt x="0" y="0"/>
+                </a:moveTo>
+                <a:lnTo>
+                  <a:pt x="120000" y="0"/>
+                </a:lnTo>
+                <a:lnTo>
+                  <a:pt x="120000" y="120000"/>
+                </a:lnTo>
+                <a:lnTo>
+                  <a:pt x="0" y="120000"/>
+                </a:lnTo>
+                <a:close/>
+              </a:path>
+            </a:pathLst>
+          </a:custGeom>
+        </p:spPr>
+      </p:sp>
+      <p:sp>
+        <p:nvSpPr>
+          <p:cNvPr id="196" name="Google Shape;196;g83e1e28387_3_6:notes"/>
+          <p:cNvSpPr txBox="1">
+            <a:spLocks noGrp="1"/>
+          </p:cNvSpPr>
+          <p:nvPr>
+            <p:ph type="body" idx="1"/>
+          </p:nvPr>
+        </p:nvSpPr>
+        <p:spPr>
+          <a:xfrm>
+            <a:off x="685800" y="4343400"/>
+            <a:ext cx="5486400" cy="4114800"/>
+          </a:xfrm>
+          <a:prstGeom prst="rect">
+            <a:avLst/>
+          </a:prstGeom>
+        </p:spPr>
+        <p:txBody>
+          <a:bodyPr spcFirstLastPara="1" wrap="square" lIns="91425" tIns="91425" rIns="91425" bIns="91425" anchor="t" anchorCtr="0">
+            <a:noAutofit/>
+          </a:bodyPr>
+          <a:lstStyle/>
+          <a:p>
+            <a:pPr marL="0" lvl="0" indent="0" algn="l" rtl="0">
+              <a:spcBef>
+                <a:spcPts val="0"/>
+              </a:spcBef>
+              <a:spcAft>
+                <a:spcPts val="0"/>
+              </a:spcAft>
+              <a:buNone/>
+            </a:pPr>
+            <a:endParaRPr/>
+          </a:p>
+        </p:txBody>
+      </p:sp>
+    </p:spTree>
+  </p:cSld>
+  <p:clrMapOvr>
+    <a:masterClrMapping/>
+  </p:clrMapOvr>
+</p:notes>
+</file>
+
+<file path=ppt/notesSlides/notesSlide34.xml><?xml version="1.0" encoding="utf-8"?>
+<p:notes xmlns:a="http://schemas.openxmlformats.org/drawingml/2006/main" xmlns:r="http://schemas.openxmlformats.org/officeDocument/2006/relationships" xmlns:p="http://schemas.openxmlformats.org/presentationml/2006/main" showMasterSp="0" showMasterPhAnim="0">
+  <p:cSld>
+    <p:spTree>
+      <p:nvGrpSpPr>
+        <p:cNvPr id="1" name="Shape 201"/>
+        <p:cNvGrpSpPr/>
+        <p:nvPr/>
+      </p:nvGrpSpPr>
+      <p:grpSpPr>
+        <a:xfrm>
+          <a:off x="0" y="0"/>
+          <a:ext cx="0" cy="0"/>
+          <a:chOff x="0" y="0"/>
+          <a:chExt cx="0" cy="0"/>
+        </a:xfrm>
+      </p:grpSpPr>
+      <p:sp>
+        <p:nvSpPr>
+          <p:cNvPr id="202" name="Google Shape;202;g7459a94ec7_0_55:notes"/>
+          <p:cNvSpPr>
+            <a:spLocks noGrp="1" noRot="1" noChangeAspect="1"/>
+          </p:cNvSpPr>
+          <p:nvPr>
+            <p:ph type="sldImg" idx="2"/>
+          </p:nvPr>
+        </p:nvSpPr>
+        <p:spPr>
+          <a:xfrm>
+            <a:off x="381000" y="685800"/>
+            <a:ext cx="6096000" cy="3429000"/>
+          </a:xfrm>
+          <a:custGeom>
+            <a:avLst/>
+            <a:gdLst/>
+            <a:ahLst/>
+            <a:cxnLst/>
+            <a:rect l="l" t="t" r="r" b="b"/>
+            <a:pathLst>
+              <a:path w="120000" h="120000" extrusionOk="0">
+                <a:moveTo>
+                  <a:pt x="0" y="0"/>
+                </a:moveTo>
+                <a:lnTo>
+                  <a:pt x="120000" y="0"/>
+                </a:lnTo>
+                <a:lnTo>
+                  <a:pt x="120000" y="120000"/>
+                </a:lnTo>
+                <a:lnTo>
+                  <a:pt x="0" y="120000"/>
+                </a:lnTo>
+                <a:close/>
+              </a:path>
+            </a:pathLst>
+          </a:custGeom>
+        </p:spPr>
+      </p:sp>
+      <p:sp>
+        <p:nvSpPr>
+          <p:cNvPr id="203" name="Google Shape;203;g7459a94ec7_0_55:notes"/>
+          <p:cNvSpPr txBox="1">
+            <a:spLocks noGrp="1"/>
+          </p:cNvSpPr>
+          <p:nvPr>
+            <p:ph type="body" idx="1"/>
+          </p:nvPr>
+        </p:nvSpPr>
+        <p:spPr>
+          <a:xfrm>
+            <a:off x="685800" y="4343400"/>
+            <a:ext cx="5486400" cy="4114800"/>
+          </a:xfrm>
+          <a:prstGeom prst="rect">
+            <a:avLst/>
+          </a:prstGeom>
+        </p:spPr>
+        <p:txBody>
+          <a:bodyPr spcFirstLastPara="1" wrap="square" lIns="91425" tIns="91425" rIns="91425" bIns="91425" anchor="t" anchorCtr="0">
+            <a:noAutofit/>
+          </a:bodyPr>
+          <a:lstStyle/>
+          <a:p>
+            <a:pPr marL="0" lvl="0" indent="0" algn="l" rtl="0">
+              <a:spcBef>
+                <a:spcPts val="0"/>
+              </a:spcBef>
+              <a:spcAft>
+                <a:spcPts val="0"/>
+              </a:spcAft>
+              <a:buNone/>
+            </a:pPr>
+            <a:endParaRPr/>
+          </a:p>
+        </p:txBody>
+      </p:sp>
+    </p:spTree>
+  </p:cSld>
+  <p:clrMapOvr>
+    <a:masterClrMapping/>
+  </p:clrMapOvr>
+</p:notes>
+</file>
+
+<file path=ppt/notesSlides/notesSlide35.xml><?xml version="1.0" encoding="utf-8"?>
 <p:notes xmlns:a="http://schemas.openxmlformats.org/drawingml/2006/main" xmlns:r="http://schemas.openxmlformats.org/officeDocument/2006/relationships" xmlns:p="http://schemas.openxmlformats.org/presentationml/2006/main" showMasterSp="0" showMasterPhAnim="0">
   <p:cSld>
     <p:spTree>
@@ -3603,7 +4481,7 @@
 </p:notes>
 </file>
 
-<file path=ppt/notesSlides/notesSlide31.xml><?xml version="1.0" encoding="utf-8"?>
+<file path=ppt/notesSlides/notesSlide36.xml><?xml version="1.0" encoding="utf-8"?>
 <p:notes xmlns:a="http://schemas.openxmlformats.org/drawingml/2006/main" xmlns:r="http://schemas.openxmlformats.org/officeDocument/2006/relationships" xmlns:p="http://schemas.openxmlformats.org/presentationml/2006/main" showMasterSp="0" showMasterPhAnim="0">
   <p:cSld>
     <p:spTree>
@@ -3695,7 +4573,79 @@
               </a:spcAft>
               <a:buNone/>
             </a:pPr>
-            <a:endParaRPr/>
+            <a:r>
+              <a:rPr lang="de-DE" dirty="0"/>
+              <a:t>Damit ist unsere Architektur weitestgehend komplett.</a:t>
+            </a:r>
+          </a:p>
+          <a:p>
+            <a:pPr marL="0" lvl="0" indent="0" algn="l" rtl="0">
+              <a:spcBef>
+                <a:spcPts val="0"/>
+              </a:spcBef>
+              <a:spcAft>
+                <a:spcPts val="0"/>
+              </a:spcAft>
+              <a:buNone/>
+            </a:pPr>
+            <a:r>
+              <a:rPr lang="de-DE" dirty="0"/>
+              <a:t>Der Stand ist damit zusammengefasst:</a:t>
+            </a:r>
+          </a:p>
+          <a:p>
+            <a:pPr marL="0" lvl="0" indent="0" algn="l" rtl="0">
+              <a:spcBef>
+                <a:spcPts val="0"/>
+              </a:spcBef>
+              <a:spcAft>
+                <a:spcPts val="0"/>
+              </a:spcAft>
+              <a:buNone/>
+            </a:pPr>
+            <a:r>
+              <a:rPr lang="de-DE" dirty="0"/>
+              <a:t>Blockchain, Image Server und Car-Provisionierung funktionieren sehr gut, </a:t>
+            </a:r>
+          </a:p>
+          <a:p>
+            <a:pPr marL="0" lvl="0" indent="0" algn="l" rtl="0">
+              <a:spcBef>
+                <a:spcPts val="0"/>
+              </a:spcBef>
+              <a:spcAft>
+                <a:spcPts val="0"/>
+              </a:spcAft>
+              <a:buNone/>
+            </a:pPr>
+            <a:r>
+              <a:rPr lang="de-DE" dirty="0"/>
+              <a:t>die App ist an sich bereit – kann aber aktuell leider och nicht an die Blockchain angebunden werden.</a:t>
+            </a:r>
+          </a:p>
+          <a:p>
+            <a:pPr marL="0" lvl="0" indent="0" algn="l" rtl="0">
+              <a:spcBef>
+                <a:spcPts val="0"/>
+              </a:spcBef>
+              <a:spcAft>
+                <a:spcPts val="0"/>
+              </a:spcAft>
+              <a:buNone/>
+            </a:pPr>
+            <a:r>
+              <a:rPr lang="de-DE" dirty="0"/>
+              <a:t>Nichtsdestotrotz zeigt euch Nils nun nochmal, wie </a:t>
+            </a:r>
+            <a:r>
+              <a:rPr lang="de-DE" dirty="0" err="1"/>
+              <a:t>carchain</a:t>
+            </a:r>
+            <a:r>
+              <a:rPr lang="de-DE" dirty="0"/>
+              <a:t> in der Praxis aussehen würde und wie es funktioniert:</a:t>
+            </a:r>
+            <a:endParaRPr dirty="0"/>
           </a:p>
         </p:txBody>
       </p:sp>
@@ -3707,7 +4657,7 @@
 </p:notes>
 </file>
 
-<file path=ppt/notesSlides/notesSlide32.xml><?xml version="1.0" encoding="utf-8"?>
+<file path=ppt/notesSlides/notesSlide37.xml><?xml version="1.0" encoding="utf-8"?>
 <p:notes xmlns:a="http://schemas.openxmlformats.org/drawingml/2006/main" xmlns:r="http://schemas.openxmlformats.org/officeDocument/2006/relationships" xmlns:p="http://schemas.openxmlformats.org/presentationml/2006/main" showMasterSp="0" showMasterPhAnim="0">
   <p:cSld>
     <p:spTree>
@@ -3811,7 +4761,7 @@
 </p:notes>
 </file>
 
-<file path=ppt/notesSlides/notesSlide33.xml><?xml version="1.0" encoding="utf-8"?>
+<file path=ppt/notesSlides/notesSlide38.xml><?xml version="1.0" encoding="utf-8"?>
 <p:notes xmlns:a="http://schemas.openxmlformats.org/drawingml/2006/main" xmlns:r="http://schemas.openxmlformats.org/officeDocument/2006/relationships" xmlns:p="http://schemas.openxmlformats.org/presentationml/2006/main" showMasterSp="0" showMasterPhAnim="0">
   <p:cSld>
     <p:spTree>
@@ -3903,11 +4853,130 @@
               </a:spcAft>
               <a:buNone/>
             </a:pPr>
-            <a:endParaRPr/>
+            <a:r>
+              <a:rPr lang="de-DE" dirty="0"/>
+              <a:t>Danke Nils. Zusammengefasst: </a:t>
+            </a:r>
+            <a:r>
+              <a:rPr lang="de-DE" dirty="0" err="1"/>
+              <a:t>Carchain</a:t>
+            </a:r>
+            <a:r>
+              <a:rPr lang="de-DE" dirty="0"/>
+              <a:t> war ein sehr interessantes wenn auch nicht triviales Projekt. Es war einiges an Denk-, Recherche und Implementierungsaufwand nötig.</a:t>
+            </a:r>
+          </a:p>
+          <a:p>
+            <a:pPr marL="0" lvl="0" indent="0" algn="l" rtl="0">
+              <a:spcBef>
+                <a:spcPts val="0"/>
+              </a:spcBef>
+              <a:spcAft>
+                <a:spcPts val="0"/>
+              </a:spcAft>
+              <a:buNone/>
+            </a:pPr>
+            <a:r>
+              <a:rPr lang="de-DE" dirty="0"/>
+              <a:t>Die Blockchain ist eine sehr spannende Technologie, aber aktuell ist vieles noch nicht vollständig ausgereift, es finden sich regelmäßig diverse Stolperfallen.</a:t>
+            </a:r>
+          </a:p>
+          <a:p>
+            <a:pPr marL="0" lvl="0" indent="0" algn="l" rtl="0">
+              <a:spcBef>
+                <a:spcPts val="0"/>
+              </a:spcBef>
+              <a:spcAft>
+                <a:spcPts val="0"/>
+              </a:spcAft>
+              <a:buNone/>
+            </a:pPr>
+            <a:r>
+              <a:rPr lang="de-DE" dirty="0"/>
+              <a:t>Die Umsetzung und Implementierung von innovativen Projekten ist daher aktuell noch etwas schwieriger, nicht zuletzt auch durch das komplexere Debugging.</a:t>
+            </a:r>
+            <a:endParaRPr dirty="0"/>
           </a:p>
         </p:txBody>
       </p:sp>
     </p:spTree>
+  </p:cSld>
+  <p:clrMapOvr>
+    <a:masterClrMapping/>
+  </p:clrMapOvr>
+</p:notes>
+</file>
+
+<file path=ppt/notesSlides/notesSlide39.xml><?xml version="1.0" encoding="utf-8"?>
+<p:notes xmlns:a="http://schemas.openxmlformats.org/drawingml/2006/main" xmlns:r="http://schemas.openxmlformats.org/officeDocument/2006/relationships" xmlns:p="http://schemas.openxmlformats.org/presentationml/2006/main">
+  <p:cSld>
+    <p:spTree>
+      <p:nvGrpSpPr>
+        <p:cNvPr id="1" name=""/>
+        <p:cNvGrpSpPr/>
+        <p:nvPr/>
+      </p:nvGrpSpPr>
+      <p:grpSpPr>
+        <a:xfrm>
+          <a:off x="0" y="0"/>
+          <a:ext cx="0" cy="0"/>
+          <a:chOff x="0" y="0"/>
+          <a:chExt cx="0" cy="0"/>
+        </a:xfrm>
+      </p:grpSpPr>
+      <p:sp>
+        <p:nvSpPr>
+          <p:cNvPr id="2" name="Folienbildplatzhalter 1"/>
+          <p:cNvSpPr>
+            <a:spLocks noGrp="1" noRot="1" noChangeAspect="1"/>
+          </p:cNvSpPr>
+          <p:nvPr>
+            <p:ph type="sldImg"/>
+          </p:nvPr>
+        </p:nvSpPr>
+        <p:spPr>
+          <a:xfrm>
+            <a:off x="381000" y="685800"/>
+            <a:ext cx="6096000" cy="3429000"/>
+          </a:xfrm>
+        </p:spPr>
+      </p:sp>
+      <p:sp>
+        <p:nvSpPr>
+          <p:cNvPr id="3" name="Notizenplatzhalter 2"/>
+          <p:cNvSpPr>
+            <a:spLocks noGrp="1"/>
+          </p:cNvSpPr>
+          <p:nvPr>
+            <p:ph type="body" idx="1"/>
+          </p:nvPr>
+        </p:nvSpPr>
+        <p:spPr/>
+        <p:txBody>
+          <a:bodyPr/>
+          <a:lstStyle/>
+          <a:p>
+            <a:r>
+              <a:rPr lang="de-DE" dirty="0"/>
+              <a:t>Wir bedanken uns für ihr Interesse und freuen uns, wenn auch Sie bald ihr nächstes Auto vertrauensvoll über </a:t>
+            </a:r>
+            <a:r>
+              <a:rPr lang="de-DE" dirty="0" err="1"/>
+              <a:t>carchain</a:t>
+            </a:r>
+            <a:r>
+              <a:rPr lang="de-DE" dirty="0"/>
+              <a:t> mieten können. Dankeschön!</a:t>
+            </a:r>
+          </a:p>
+        </p:txBody>
+      </p:sp>
+    </p:spTree>
+    <p:extLst>
+      <p:ext uri="{BB962C8B-B14F-4D97-AF65-F5344CB8AC3E}">
+        <p14:creationId xmlns:p14="http://schemas.microsoft.com/office/powerpoint/2010/main" val="3415304219"/>
+      </p:ext>
+    </p:extLst>
   </p:cSld>
   <p:clrMapOvr>
     <a:masterClrMapping/>
@@ -3997,6 +5066,113 @@
             <a:noAutofit/>
           </a:bodyPr>
           <a:lstStyle/>
+          <a:p>
+            <a:pPr marL="0" lvl="0" indent="0" algn="l" rtl="0">
+              <a:spcBef>
+                <a:spcPts val="0"/>
+              </a:spcBef>
+              <a:spcAft>
+                <a:spcPts val="0"/>
+              </a:spcAft>
+              <a:buNone/>
+            </a:pPr>
+            <a:r>
+              <a:rPr lang="de-DE" dirty="0"/>
+              <a:t>Die Idee ist recht offensichtlich:</a:t>
+            </a:r>
+          </a:p>
+          <a:p>
+            <a:pPr marL="0" lvl="0" indent="0" algn="l" rtl="0">
+              <a:spcBef>
+                <a:spcPts val="0"/>
+              </a:spcBef>
+              <a:spcAft>
+                <a:spcPts val="0"/>
+              </a:spcAft>
+              <a:buNone/>
+            </a:pPr>
+            <a:r>
+              <a:rPr lang="de-DE" dirty="0"/>
+              <a:t>Bob ist Mediziner und mit der aktuellen Lage sehr beschäftigt und quasi täglich im  Labor.</a:t>
+            </a:r>
+          </a:p>
+          <a:p>
+            <a:pPr marL="0" lvl="0" indent="0" algn="l" rtl="0">
+              <a:spcBef>
+                <a:spcPts val="0"/>
+              </a:spcBef>
+              <a:spcAft>
+                <a:spcPts val="0"/>
+              </a:spcAft>
+              <a:buNone/>
+            </a:pPr>
+            <a:r>
+              <a:rPr lang="de-DE" dirty="0"/>
+              <a:t>Alice ist gerade im </a:t>
+            </a:r>
+            <a:r>
+              <a:rPr lang="de-DE" dirty="0" err="1"/>
+              <a:t>HomeOffice</a:t>
+            </a:r>
+            <a:r>
+              <a:rPr lang="de-DE" dirty="0"/>
+              <a:t> und muss ab und zu einkaufen – besitzt aber kein Auto.</a:t>
+            </a:r>
+          </a:p>
+          <a:p>
+            <a:pPr marL="0" lvl="0" indent="0" algn="l" rtl="0">
+              <a:spcBef>
+                <a:spcPts val="0"/>
+              </a:spcBef>
+              <a:spcAft>
+                <a:spcPts val="0"/>
+              </a:spcAft>
+              <a:buNone/>
+            </a:pPr>
+            <a:r>
+              <a:rPr lang="de-DE" dirty="0"/>
+              <a:t>Wie kann Alice trotzdem einkaufen?</a:t>
+            </a:r>
+          </a:p>
+          <a:p>
+            <a:pPr marL="0" lvl="0" indent="0" algn="l" rtl="0">
+              <a:spcBef>
+                <a:spcPts val="0"/>
+              </a:spcBef>
+              <a:spcAft>
+                <a:spcPts val="0"/>
+              </a:spcAft>
+              <a:buNone/>
+            </a:pPr>
+            <a:endParaRPr lang="de-DE" dirty="0"/>
+          </a:p>
+          <a:p>
+            <a:pPr marL="0" lvl="0" indent="0" algn="l" rtl="0">
+              <a:spcBef>
+                <a:spcPts val="0"/>
+              </a:spcBef>
+              <a:spcAft>
+                <a:spcPts val="0"/>
+              </a:spcAft>
+              <a:buNone/>
+            </a:pPr>
+            <a:r>
+              <a:rPr lang="de-DE" dirty="0"/>
+              <a:t>Da Bob sein Auto im Labor gerade nicht regelmäßig benötigt, *KLICK*</a:t>
+            </a:r>
+          </a:p>
+          <a:p>
+            <a:pPr marL="0" lvl="0" indent="0" algn="l" rtl="0">
+              <a:spcBef>
+                <a:spcPts val="0"/>
+              </a:spcBef>
+              <a:spcAft>
+                <a:spcPts val="0"/>
+              </a:spcAft>
+              <a:buNone/>
+            </a:pPr>
+            <a:endParaRPr lang="de-DE" dirty="0"/>
+          </a:p>
           <a:p>
             <a:pPr marL="0" lvl="0" indent="0" algn="l" rtl="0">
               <a:spcBef>
@@ -4184,6 +5360,92 @@
             <a:noAutofit/>
           </a:bodyPr>
           <a:lstStyle/>
+          <a:p>
+            <a:pPr marL="0" lvl="0" indent="0" algn="l" rtl="0">
+              <a:spcBef>
+                <a:spcPts val="0"/>
+              </a:spcBef>
+              <a:spcAft>
+                <a:spcPts val="0"/>
+              </a:spcAft>
+              <a:buNone/>
+            </a:pPr>
+            <a:r>
+              <a:rPr lang="de-DE" dirty="0"/>
+              <a:t>zückt er sein Handy und bietet es kurzerhand auf dieser coolen neuen Plattform „</a:t>
+            </a:r>
+            <a:r>
+              <a:rPr lang="de-DE" dirty="0" err="1"/>
+              <a:t>carchain</a:t>
+            </a:r>
+            <a:r>
+              <a:rPr lang="de-DE" dirty="0"/>
+              <a:t>“ an. Dazu gibt er die Daten des Fahrzeugs und den gewünschten Preis ein. </a:t>
+            </a:r>
+          </a:p>
+          <a:p>
+            <a:pPr marL="0" lvl="0" indent="0" algn="l" rtl="0">
+              <a:spcBef>
+                <a:spcPts val="0"/>
+              </a:spcBef>
+              <a:spcAft>
+                <a:spcPts val="0"/>
+              </a:spcAft>
+              <a:buNone/>
+            </a:pPr>
+            <a:r>
+              <a:rPr lang="de-DE" dirty="0"/>
+              <a:t>Die Daten werden in der Blockchain gespeichert *klick* – </a:t>
+            </a:r>
+          </a:p>
+          <a:p>
+            <a:pPr marL="0" lvl="0" indent="0" algn="l" rtl="0">
+              <a:spcBef>
+                <a:spcPts val="0"/>
+              </a:spcBef>
+              <a:spcAft>
+                <a:spcPts val="0"/>
+              </a:spcAft>
+              <a:buNone/>
+            </a:pPr>
+            <a:endParaRPr lang="de-DE" dirty="0"/>
+          </a:p>
+          <a:p>
+            <a:pPr marL="0" lvl="0" indent="0" algn="l" rtl="0">
+              <a:spcBef>
+                <a:spcPts val="0"/>
+              </a:spcBef>
+              <a:spcAft>
+                <a:spcPts val="0"/>
+              </a:spcAft>
+              <a:buNone/>
+            </a:pPr>
+            <a:endParaRPr lang="de-DE" dirty="0"/>
+          </a:p>
+          <a:p>
+            <a:pPr marL="0" lvl="0" indent="0" algn="l" rtl="0">
+              <a:spcBef>
+                <a:spcPts val="0"/>
+              </a:spcBef>
+              <a:spcAft>
+                <a:spcPts val="0"/>
+              </a:spcAft>
+              <a:buNone/>
+            </a:pPr>
+            <a:endParaRPr lang="de-DE" dirty="0"/>
+          </a:p>
+          <a:p>
+            <a:pPr marL="0" lvl="0" indent="0" algn="l" rtl="0">
+              <a:spcBef>
+                <a:spcPts val="0"/>
+              </a:spcBef>
+              <a:spcAft>
+                <a:spcPts val="0"/>
+              </a:spcAft>
+              <a:buNone/>
+            </a:pPr>
+            <a:endParaRPr lang="de-DE" dirty="0"/>
+          </a:p>
           <a:p>
             <a:pPr marL="0" lvl="0" indent="0" algn="l" rtl="0">
               <a:spcBef>
@@ -4388,6 +5650,72 @@
             </a:pPr>
             <a:r>
               <a:rPr lang="de-DE" dirty="0"/>
+              <a:t>das Auto ist jetzt bereit! Nun kann Alice wiederum auf ihrem Smartphone Bobs Auto finden.</a:t>
+            </a:r>
+          </a:p>
+          <a:p>
+            <a:pPr marL="0" lvl="0" indent="0" algn="l" rtl="0">
+              <a:spcBef>
+                <a:spcPts val="0"/>
+              </a:spcBef>
+              <a:spcAft>
+                <a:spcPts val="0"/>
+              </a:spcAft>
+              <a:buNone/>
+            </a:pPr>
+            <a:r>
+              <a:rPr lang="de-DE" dirty="0"/>
+              <a:t>Da Sie immer noch einkaufen muss, mietet sie das Auto für 2 Stunden und transferiert den erforderlichen Betrag. *klick*</a:t>
+            </a:r>
+          </a:p>
+          <a:p>
+            <a:pPr marL="0" lvl="0" indent="0" algn="l" rtl="0">
+              <a:spcBef>
+                <a:spcPts val="0"/>
+              </a:spcBef>
+              <a:spcAft>
+                <a:spcPts val="0"/>
+              </a:spcAft>
+              <a:buNone/>
+            </a:pPr>
+            <a:endParaRPr lang="de-DE" dirty="0"/>
+          </a:p>
+          <a:p>
+            <a:pPr marL="0" lvl="0" indent="0" algn="l" rtl="0">
+              <a:spcBef>
+                <a:spcPts val="0"/>
+              </a:spcBef>
+              <a:spcAft>
+                <a:spcPts val="0"/>
+              </a:spcAft>
+              <a:buNone/>
+            </a:pPr>
+            <a:endParaRPr lang="de-DE" dirty="0"/>
+          </a:p>
+          <a:p>
+            <a:pPr marL="0" lvl="0" indent="0" algn="l" rtl="0">
+              <a:spcBef>
+                <a:spcPts val="0"/>
+              </a:spcBef>
+              <a:spcAft>
+                <a:spcPts val="0"/>
+              </a:spcAft>
+              <a:buNone/>
+            </a:pPr>
+            <a:endParaRPr lang="de-DE" dirty="0"/>
+          </a:p>
+          <a:p>
+            <a:pPr marL="0" lvl="0" indent="0" algn="l" rtl="0">
+              <a:spcBef>
+                <a:spcPts val="0"/>
+              </a:spcBef>
+              <a:spcAft>
+                <a:spcPts val="0"/>
+              </a:spcAft>
+              <a:buNone/>
+            </a:pPr>
+            <a:r>
+              <a:rPr lang="de-DE" dirty="0"/>
               <a:t>(Idee mit Piktogrammen &amp; Animationen)</a:t>
             </a:r>
             <a:br>
@@ -4569,6 +5897,80 @@
           </a:bodyPr>
           <a:lstStyle/>
           <a:p>
+            <a:pPr marL="0" marR="0" lvl="0" indent="0" algn="l" defTabSz="914400" rtl="0" eaLnBrk="1" fontAlgn="auto" latinLnBrk="0" hangingPunct="1">
+              <a:lnSpc>
+                <a:spcPct val="100000"/>
+              </a:lnSpc>
+              <a:spcBef>
+                <a:spcPts val="0"/>
+              </a:spcBef>
+              <a:spcAft>
+                <a:spcPts val="0"/>
+              </a:spcAft>
+              <a:buClr>
+                <a:srgbClr val="000000"/>
+              </a:buClr>
+              <a:buSzPts val="1100"/>
+              <a:buFont typeface="Arial"/>
+              <a:buNone/>
+              <a:tabLst/>
+              <a:defRPr/>
+            </a:pPr>
+            <a:r>
+              <a:rPr lang="de-DE" dirty="0"/>
+              <a:t>Sie bekommt nun Zugriff auf das Fahrzeug – der digitale Autoschlüssel in ihrer App ist freigeschalten.</a:t>
+            </a:r>
+          </a:p>
+          <a:p>
+            <a:pPr marL="0" marR="0" lvl="0" indent="0" algn="l" defTabSz="914400" rtl="0" eaLnBrk="1" fontAlgn="auto" latinLnBrk="0" hangingPunct="1">
+              <a:lnSpc>
+                <a:spcPct val="100000"/>
+              </a:lnSpc>
+              <a:spcBef>
+                <a:spcPts val="0"/>
+              </a:spcBef>
+              <a:spcAft>
+                <a:spcPts val="0"/>
+              </a:spcAft>
+              <a:buClr>
+                <a:srgbClr val="000000"/>
+              </a:buClr>
+              <a:buSzPts val="1100"/>
+              <a:buFont typeface="Arial"/>
+              <a:buNone/>
+              <a:tabLst/>
+              <a:defRPr/>
+            </a:pPr>
+            <a:r>
+              <a:rPr lang="de-DE" dirty="0"/>
+              <a:t>Mit ihrem Smartphone geht Alice zum Auto *klick*</a:t>
+            </a:r>
+          </a:p>
+          <a:p>
+            <a:pPr marL="0" lvl="0" indent="0" algn="l" rtl="0">
+              <a:spcBef>
+                <a:spcPts val="0"/>
+              </a:spcBef>
+              <a:spcAft>
+                <a:spcPts val="0"/>
+              </a:spcAft>
+              <a:buNone/>
+            </a:pPr>
+            <a:endParaRPr lang="de-DE" dirty="0"/>
+          </a:p>
+          <a:p>
+            <a:pPr marL="0" lvl="0" indent="0" algn="l" rtl="0">
+              <a:spcBef>
+                <a:spcPts val="0"/>
+              </a:spcBef>
+              <a:spcAft>
+                <a:spcPts val="0"/>
+              </a:spcAft>
+              <a:buNone/>
+            </a:pPr>
+            <a:endParaRPr lang="de-DE" dirty="0"/>
+          </a:p>
+          <a:p>
             <a:pPr marL="0" lvl="0" indent="0" algn="l" rtl="0">
               <a:spcBef>
                 <a:spcPts val="0"/>
@@ -4772,6 +6174,57 @@
             </a:pPr>
             <a:r>
               <a:rPr lang="de-DE" dirty="0"/>
+              <a:t>Und lässt den generierten QR-Code von einer im Auto angebrachten Kamera auslesen.</a:t>
+            </a:r>
+          </a:p>
+          <a:p>
+            <a:pPr marL="0" lvl="0" indent="0" algn="l" rtl="0">
+              <a:spcBef>
+                <a:spcPts val="0"/>
+              </a:spcBef>
+              <a:spcAft>
+                <a:spcPts val="0"/>
+              </a:spcAft>
+              <a:buNone/>
+            </a:pPr>
+            <a:endParaRPr lang="de-DE" dirty="0"/>
+          </a:p>
+          <a:p>
+            <a:pPr marL="0" lvl="0" indent="0" algn="l" rtl="0">
+              <a:spcBef>
+                <a:spcPts val="0"/>
+              </a:spcBef>
+              <a:spcAft>
+                <a:spcPts val="0"/>
+              </a:spcAft>
+              <a:buNone/>
+            </a:pPr>
+            <a:endParaRPr lang="de-DE" dirty="0"/>
+          </a:p>
+          <a:p>
+            <a:pPr marL="0" lvl="0" indent="0" algn="l" rtl="0">
+              <a:spcBef>
+                <a:spcPts val="0"/>
+              </a:spcBef>
+              <a:spcAft>
+                <a:spcPts val="0"/>
+              </a:spcAft>
+              <a:buNone/>
+            </a:pPr>
+            <a:endParaRPr lang="de-DE" dirty="0"/>
+          </a:p>
+          <a:p>
+            <a:pPr marL="0" lvl="0" indent="0" algn="l" rtl="0">
+              <a:spcBef>
+                <a:spcPts val="0"/>
+              </a:spcBef>
+              <a:spcAft>
+                <a:spcPts val="0"/>
+              </a:spcAft>
+              <a:buNone/>
+            </a:pPr>
+            <a:r>
+              <a:rPr lang="de-DE" dirty="0"/>
               <a:t>(Idee mit Piktogrammen &amp; Animationen)</a:t>
             </a:r>
             <a:br>
@@ -4952,6 +6405,45 @@
             <a:noAutofit/>
           </a:bodyPr>
           <a:lstStyle/>
+          <a:p>
+            <a:pPr marL="0" lvl="0" indent="0" algn="l" rtl="0">
+              <a:spcBef>
+                <a:spcPts val="0"/>
+              </a:spcBef>
+              <a:spcAft>
+                <a:spcPts val="0"/>
+              </a:spcAft>
+              <a:buNone/>
+            </a:pPr>
+            <a:r>
+              <a:rPr lang="de-DE" dirty="0"/>
+              <a:t>Jetzt kann Alice einsteigen, und sich auf den Weg machen.</a:t>
+            </a:r>
+          </a:p>
+          <a:p>
+            <a:pPr marL="0" lvl="0" indent="0" algn="l" rtl="0">
+              <a:spcBef>
+                <a:spcPts val="0"/>
+              </a:spcBef>
+              <a:spcAft>
+                <a:spcPts val="0"/>
+              </a:spcAft>
+              <a:buNone/>
+            </a:pPr>
+            <a:endParaRPr lang="de-DE" dirty="0"/>
+          </a:p>
+          <a:p>
+            <a:pPr marL="0" lvl="0" indent="0" algn="l" rtl="0">
+              <a:spcBef>
+                <a:spcPts val="0"/>
+              </a:spcBef>
+              <a:spcAft>
+                <a:spcPts val="0"/>
+              </a:spcAft>
+              <a:buNone/>
+            </a:pPr>
+            <a:endParaRPr lang="de-DE" dirty="0"/>
+          </a:p>
           <a:p>
             <a:pPr marL="0" lvl="0" indent="0" algn="l" rtl="0">
               <a:spcBef>
@@ -14079,7 +15571,7 @@
           <p:nvPr/>
         </p:nvPicPr>
         <p:blipFill>
-          <a:blip r:embed="rId2"/>
+          <a:blip r:embed="rId3"/>
           <a:stretch>
             <a:fillRect/>
           </a:stretch>
@@ -14232,7 +15724,7 @@
           <p:nvPr/>
         </p:nvPicPr>
         <p:blipFill>
-          <a:blip r:embed="rId2"/>
+          <a:blip r:embed="rId3"/>
           <a:srcRect/>
           <a:stretch/>
         </p:blipFill>
@@ -14261,7 +15753,7 @@
           <p:nvPr/>
         </p:nvPicPr>
         <p:blipFill>
-          <a:blip r:embed="rId3"/>
+          <a:blip r:embed="rId4"/>
           <a:srcRect/>
           <a:stretch/>
         </p:blipFill>
@@ -14413,7 +15905,7 @@
           <p:nvPr/>
         </p:nvPicPr>
         <p:blipFill>
-          <a:blip r:embed="rId2"/>
+          <a:blip r:embed="rId3"/>
           <a:srcRect/>
           <a:stretch/>
         </p:blipFill>
@@ -14569,7 +16061,7 @@
           <p:nvPr/>
         </p:nvPicPr>
         <p:blipFill>
-          <a:blip r:embed="rId2"/>
+          <a:blip r:embed="rId3"/>
           <a:srcRect/>
           <a:stretch/>
         </p:blipFill>
@@ -20842,7 +22334,7 @@
                                           </p:stCondLst>
                                         </p:cTn>
                                         <p:tgtEl>
-                                          <p:spTgt spid="31"/>
+                                          <p:spTgt spid="3"/>
                                         </p:tgtEl>
                                         <p:attrNameLst>
                                           <p:attrName>style.visibility</p:attrName>
@@ -20856,6 +22348,59 @@
                                       <p:cBhvr>
                                         <p:cTn id="18" dur="500"/>
                                         <p:tgtEl>
+                                          <p:spTgt spid="3"/>
+                                        </p:tgtEl>
+                                      </p:cBhvr>
+                                    </p:animEffect>
+                                  </p:childTnLst>
+                                </p:cTn>
+                              </p:par>
+                            </p:childTnLst>
+                          </p:cTn>
+                        </p:par>
+                      </p:childTnLst>
+                    </p:cTn>
+                  </p:par>
+                  <p:par>
+                    <p:cTn id="19" fill="hold">
+                      <p:stCondLst>
+                        <p:cond delay="indefinite"/>
+                      </p:stCondLst>
+                      <p:childTnLst>
+                        <p:par>
+                          <p:cTn id="20" fill="hold">
+                            <p:stCondLst>
+                              <p:cond delay="0"/>
+                            </p:stCondLst>
+                            <p:childTnLst>
+                              <p:par>
+                                <p:cTn id="21" presetID="10" presetClass="entr" presetSubtype="0" fill="hold" nodeType="clickEffect">
+                                  <p:stCondLst>
+                                    <p:cond delay="0"/>
+                                  </p:stCondLst>
+                                  <p:childTnLst>
+                                    <p:set>
+                                      <p:cBhvr>
+                                        <p:cTn id="22" dur="1" fill="hold">
+                                          <p:stCondLst>
+                                            <p:cond delay="0"/>
+                                          </p:stCondLst>
+                                        </p:cTn>
+                                        <p:tgtEl>
+                                          <p:spTgt spid="31"/>
+                                        </p:tgtEl>
+                                        <p:attrNameLst>
+                                          <p:attrName>style.visibility</p:attrName>
+                                        </p:attrNameLst>
+                                      </p:cBhvr>
+                                      <p:to>
+                                        <p:strVal val="visible"/>
+                                      </p:to>
+                                    </p:set>
+                                    <p:animEffect transition="in" filter="fade">
+                                      <p:cBhvr>
+                                        <p:cTn id="23" dur="500"/>
+                                        <p:tgtEl>
                                           <p:spTgt spid="31"/>
                                         </p:tgtEl>
                                       </p:cBhvr>
@@ -20864,14 +22409,14 @@
                                 </p:cTn>
                               </p:par>
                               <p:par>
-                                <p:cTn id="19" presetID="10" presetClass="entr" presetSubtype="0" fill="hold" nodeType="withEffect">
+                                <p:cTn id="24" presetID="10" presetClass="entr" presetSubtype="0" fill="hold" nodeType="withEffect">
                                   <p:stCondLst>
                                     <p:cond delay="0"/>
                                   </p:stCondLst>
                                   <p:childTnLst>
                                     <p:set>
                                       <p:cBhvr>
-                                        <p:cTn id="20" dur="1" fill="hold">
+                                        <p:cTn id="25" dur="1" fill="hold">
                                           <p:stCondLst>
                                             <p:cond delay="0"/>
                                           </p:stCondLst>
@@ -20889,62 +22434,9 @@
                                     </p:set>
                                     <p:animEffect transition="in" filter="fade">
                                       <p:cBhvr>
-                                        <p:cTn id="21" dur="500"/>
+                                        <p:cTn id="26" dur="500"/>
                                         <p:tgtEl>
                                           <p:spTgt spid="15"/>
-                                        </p:tgtEl>
-                                      </p:cBhvr>
-                                    </p:animEffect>
-                                  </p:childTnLst>
-                                </p:cTn>
-                              </p:par>
-                            </p:childTnLst>
-                          </p:cTn>
-                        </p:par>
-                      </p:childTnLst>
-                    </p:cTn>
-                  </p:par>
-                  <p:par>
-                    <p:cTn id="22" fill="hold">
-                      <p:stCondLst>
-                        <p:cond delay="indefinite"/>
-                      </p:stCondLst>
-                      <p:childTnLst>
-                        <p:par>
-                          <p:cTn id="23" fill="hold">
-                            <p:stCondLst>
-                              <p:cond delay="0"/>
-                            </p:stCondLst>
-                            <p:childTnLst>
-                              <p:par>
-                                <p:cTn id="24" presetID="10" presetClass="entr" presetSubtype="0" fill="hold" nodeType="clickEffect">
-                                  <p:stCondLst>
-                                    <p:cond delay="0"/>
-                                  </p:stCondLst>
-                                  <p:childTnLst>
-                                    <p:set>
-                                      <p:cBhvr>
-                                        <p:cTn id="25" dur="1" fill="hold">
-                                          <p:stCondLst>
-                                            <p:cond delay="0"/>
-                                          </p:stCondLst>
-                                        </p:cTn>
-                                        <p:tgtEl>
-                                          <p:spTgt spid="3"/>
-                                        </p:tgtEl>
-                                        <p:attrNameLst>
-                                          <p:attrName>style.visibility</p:attrName>
-                                        </p:attrNameLst>
-                                      </p:cBhvr>
-                                      <p:to>
-                                        <p:strVal val="visible"/>
-                                      </p:to>
-                                    </p:set>
-                                    <p:animEffect transition="in" filter="fade">
-                                      <p:cBhvr>
-                                        <p:cTn id="26" dur="500"/>
-                                        <p:tgtEl>
-                                          <p:spTgt spid="3"/>
                                         </p:tgtEl>
                                       </p:cBhvr>
                                     </p:animEffect>

</xml_diff>